<commit_message>
update ppt mod4 y mod5
</commit_message>
<xml_diff>
--- a/ppts/Intro to Junos OS - Modulo 3.pptx
+++ b/ppts/Intro to Junos OS - Modulo 3.pptx
@@ -154,6 +154,7 @@
 <file path=ppt/revisionInfo.xml><?xml version="1.0" encoding="utf-8"?>
 <p1510:revInfo xmlns:a="http://schemas.openxmlformats.org/drawingml/2006/main" xmlns:r="http://schemas.openxmlformats.org/officeDocument/2006/relationships" xmlns:p1510="http://schemas.microsoft.com/office/powerpoint/2015/10/main">
   <p1510:revLst>
+    <p1510:client id="{25CCCBBB-F558-4A29-9945-0D5E7B18F6C8}" v="36" dt="2022-08-05T02:55:51.762"/>
     <p1510:client id="{7764BF26-6C29-4F72-93A4-5DAFD0922132}" v="14" dt="2022-03-21T22:55:29.343"/>
   </p1510:revLst>
 </p1510:revInfo>
@@ -161,6 +162,223 @@
 
 <file path=ppt/changesInfos/changesInfo1.xml><?xml version="1.0" encoding="utf-8"?>
 <pc:chgInfo xmlns:a="http://schemas.openxmlformats.org/drawingml/2006/main" xmlns:r="http://schemas.openxmlformats.org/officeDocument/2006/relationships" xmlns:ac="http://schemas.microsoft.com/office/drawing/2013/main/command" xmlns:pc="http://schemas.microsoft.com/office/powerpoint/2013/main/command">
+  <pc:docChgLst>
+    <pc:chgData name="Carlos Leonel Ramirez Martinez" userId="14d3900238d93848" providerId="Windows Live" clId="Web-{25CCCBBB-F558-4A29-9945-0D5E7B18F6C8}"/>
+    <pc:docChg chg="modSld">
+      <pc:chgData name="Carlos Leonel Ramirez Martinez" userId="14d3900238d93848" providerId="Windows Live" clId="Web-{25CCCBBB-F558-4A29-9945-0D5E7B18F6C8}" dt="2022-08-05T02:55:51.762" v="35"/>
+      <pc:docMkLst>
+        <pc:docMk/>
+      </pc:docMkLst>
+      <pc:sldChg chg="modSp">
+        <pc:chgData name="Carlos Leonel Ramirez Martinez" userId="14d3900238d93848" providerId="Windows Live" clId="Web-{25CCCBBB-F558-4A29-9945-0D5E7B18F6C8}" dt="2022-08-05T01:47:25.298" v="1" actId="20577"/>
+        <pc:sldMkLst>
+          <pc:docMk/>
+          <pc:sldMk cId="1569780132" sldId="343"/>
+        </pc:sldMkLst>
+        <pc:spChg chg="mod">
+          <ac:chgData name="Carlos Leonel Ramirez Martinez" userId="14d3900238d93848" providerId="Windows Live" clId="Web-{25CCCBBB-F558-4A29-9945-0D5E7B18F6C8}" dt="2022-08-05T01:47:25.298" v="1" actId="20577"/>
+          <ac:spMkLst>
+            <pc:docMk/>
+            <pc:sldMk cId="1569780132" sldId="343"/>
+            <ac:spMk id="3" creationId="{00000000-0000-0000-0000-000000000000}"/>
+          </ac:spMkLst>
+        </pc:spChg>
+      </pc:sldChg>
+      <pc:sldChg chg="modSp">
+        <pc:chgData name="Carlos Leonel Ramirez Martinez" userId="14d3900238d93848" providerId="Windows Live" clId="Web-{25CCCBBB-F558-4A29-9945-0D5E7B18F6C8}" dt="2022-08-05T02:05:08.430" v="13" actId="20577"/>
+        <pc:sldMkLst>
+          <pc:docMk/>
+          <pc:sldMk cId="950461353" sldId="345"/>
+        </pc:sldMkLst>
+        <pc:spChg chg="mod">
+          <ac:chgData name="Carlos Leonel Ramirez Martinez" userId="14d3900238d93848" providerId="Windows Live" clId="Web-{25CCCBBB-F558-4A29-9945-0D5E7B18F6C8}" dt="2022-08-05T02:05:08.430" v="13" actId="20577"/>
+          <ac:spMkLst>
+            <pc:docMk/>
+            <pc:sldMk cId="950461353" sldId="345"/>
+            <ac:spMk id="3" creationId="{00000000-0000-0000-0000-000000000000}"/>
+          </ac:spMkLst>
+        </pc:spChg>
+      </pc:sldChg>
+      <pc:sldChg chg="modSp">
+        <pc:chgData name="Carlos Leonel Ramirez Martinez" userId="14d3900238d93848" providerId="Windows Live" clId="Web-{25CCCBBB-F558-4A29-9945-0D5E7B18F6C8}" dt="2022-08-05T02:07:32.592" v="16" actId="20577"/>
+        <pc:sldMkLst>
+          <pc:docMk/>
+          <pc:sldMk cId="961991732" sldId="346"/>
+        </pc:sldMkLst>
+        <pc:spChg chg="mod">
+          <ac:chgData name="Carlos Leonel Ramirez Martinez" userId="14d3900238d93848" providerId="Windows Live" clId="Web-{25CCCBBB-F558-4A29-9945-0D5E7B18F6C8}" dt="2022-08-05T02:07:32.592" v="16" actId="20577"/>
+          <ac:spMkLst>
+            <pc:docMk/>
+            <pc:sldMk cId="961991732" sldId="346"/>
+            <ac:spMk id="3" creationId="{00000000-0000-0000-0000-000000000000}"/>
+          </ac:spMkLst>
+        </pc:spChg>
+      </pc:sldChg>
+      <pc:sldChg chg="modSp">
+        <pc:chgData name="Carlos Leonel Ramirez Martinez" userId="14d3900238d93848" providerId="Windows Live" clId="Web-{25CCCBBB-F558-4A29-9945-0D5E7B18F6C8}" dt="2022-08-05T01:58:02.399" v="8" actId="20577"/>
+        <pc:sldMkLst>
+          <pc:docMk/>
+          <pc:sldMk cId="1117841992" sldId="429"/>
+        </pc:sldMkLst>
+        <pc:spChg chg="mod">
+          <ac:chgData name="Carlos Leonel Ramirez Martinez" userId="14d3900238d93848" providerId="Windows Live" clId="Web-{25CCCBBB-F558-4A29-9945-0D5E7B18F6C8}" dt="2022-08-05T01:58:02.399" v="8" actId="20577"/>
+          <ac:spMkLst>
+            <pc:docMk/>
+            <pc:sldMk cId="1117841992" sldId="429"/>
+            <ac:spMk id="3" creationId="{00000000-0000-0000-0000-000000000000}"/>
+          </ac:spMkLst>
+        </pc:spChg>
+      </pc:sldChg>
+      <pc:sldChg chg="modSp">
+        <pc:chgData name="Carlos Leonel Ramirez Martinez" userId="14d3900238d93848" providerId="Windows Live" clId="Web-{25CCCBBB-F558-4A29-9945-0D5E7B18F6C8}" dt="2022-08-05T02:16:03.954" v="19" actId="1076"/>
+        <pc:sldMkLst>
+          <pc:docMk/>
+          <pc:sldMk cId="1738586882" sldId="430"/>
+        </pc:sldMkLst>
+        <pc:picChg chg="mod">
+          <ac:chgData name="Carlos Leonel Ramirez Martinez" userId="14d3900238d93848" providerId="Windows Live" clId="Web-{25CCCBBB-F558-4A29-9945-0D5E7B18F6C8}" dt="2022-08-05T02:16:03.954" v="19" actId="1076"/>
+          <ac:picMkLst>
+            <pc:docMk/>
+            <pc:sldMk cId="1738586882" sldId="430"/>
+            <ac:picMk id="6" creationId="{6C8E3B66-E8F3-5C4D-4C07-CF98BDEDDDCE}"/>
+          </ac:picMkLst>
+        </pc:picChg>
+      </pc:sldChg>
+      <pc:sldChg chg="modSp">
+        <pc:chgData name="Carlos Leonel Ramirez Martinez" userId="14d3900238d93848" providerId="Windows Live" clId="Web-{25CCCBBB-F558-4A29-9945-0D5E7B18F6C8}" dt="2022-08-05T02:17:59.380" v="22" actId="1076"/>
+        <pc:sldMkLst>
+          <pc:docMk/>
+          <pc:sldMk cId="4239516971" sldId="431"/>
+        </pc:sldMkLst>
+        <pc:picChg chg="mod">
+          <ac:chgData name="Carlos Leonel Ramirez Martinez" userId="14d3900238d93848" providerId="Windows Live" clId="Web-{25CCCBBB-F558-4A29-9945-0D5E7B18F6C8}" dt="2022-08-05T02:17:59.380" v="22" actId="1076"/>
+          <ac:picMkLst>
+            <pc:docMk/>
+            <pc:sldMk cId="4239516971" sldId="431"/>
+            <ac:picMk id="5" creationId="{BD0AE6BC-0FD8-6386-DA2F-D1D11492FA7D}"/>
+          </ac:picMkLst>
+        </pc:picChg>
+      </pc:sldChg>
+      <pc:sldChg chg="addSp">
+        <pc:chgData name="Carlos Leonel Ramirez Martinez" userId="14d3900238d93848" providerId="Windows Live" clId="Web-{25CCCBBB-F558-4A29-9945-0D5E7B18F6C8}" dt="2022-08-05T02:54:08.070" v="24"/>
+        <pc:sldMkLst>
+          <pc:docMk/>
+          <pc:sldMk cId="918148024" sldId="437"/>
+        </pc:sldMkLst>
+        <pc:inkChg chg="add">
+          <ac:chgData name="Carlos Leonel Ramirez Martinez" userId="14d3900238d93848" providerId="Windows Live" clId="Web-{25CCCBBB-F558-4A29-9945-0D5E7B18F6C8}" dt="2022-08-05T02:54:03.742" v="23"/>
+          <ac:inkMkLst>
+            <pc:docMk/>
+            <pc:sldMk cId="918148024" sldId="437"/>
+            <ac:inkMk id="4" creationId="{1CF9C29F-F06D-D8CE-48F1-D64215EEC5D5}"/>
+          </ac:inkMkLst>
+        </pc:inkChg>
+        <pc:inkChg chg="add">
+          <ac:chgData name="Carlos Leonel Ramirez Martinez" userId="14d3900238d93848" providerId="Windows Live" clId="Web-{25CCCBBB-F558-4A29-9945-0D5E7B18F6C8}" dt="2022-08-05T02:54:08.070" v="24"/>
+          <ac:inkMkLst>
+            <pc:docMk/>
+            <pc:sldMk cId="918148024" sldId="437"/>
+            <ac:inkMk id="6" creationId="{D9DEBA31-2684-AF01-D4FF-E95F9A29CECF}"/>
+          </ac:inkMkLst>
+        </pc:inkChg>
+      </pc:sldChg>
+      <pc:sldChg chg="addSp">
+        <pc:chgData name="Carlos Leonel Ramirez Martinez" userId="14d3900238d93848" providerId="Windows Live" clId="Web-{25CCCBBB-F558-4A29-9945-0D5E7B18F6C8}" dt="2022-08-05T02:55:51.762" v="35"/>
+        <pc:sldMkLst>
+          <pc:docMk/>
+          <pc:sldMk cId="3071268492" sldId="438"/>
+        </pc:sldMkLst>
+        <pc:inkChg chg="add">
+          <ac:chgData name="Carlos Leonel Ramirez Martinez" userId="14d3900238d93848" providerId="Windows Live" clId="Web-{25CCCBBB-F558-4A29-9945-0D5E7B18F6C8}" dt="2022-08-05T02:54:15.774" v="25"/>
+          <ac:inkMkLst>
+            <pc:docMk/>
+            <pc:sldMk cId="3071268492" sldId="438"/>
+            <ac:inkMk id="4" creationId="{617831BD-FCAD-A980-0D3B-8E6CA515ED47}"/>
+          </ac:inkMkLst>
+        </pc:inkChg>
+        <pc:inkChg chg="add">
+          <ac:chgData name="Carlos Leonel Ramirez Martinez" userId="14d3900238d93848" providerId="Windows Live" clId="Web-{25CCCBBB-F558-4A29-9945-0D5E7B18F6C8}" dt="2022-08-05T02:54:41.181" v="26"/>
+          <ac:inkMkLst>
+            <pc:docMk/>
+            <pc:sldMk cId="3071268492" sldId="438"/>
+            <ac:inkMk id="5" creationId="{4356B125-E8FB-D920-F318-D52C09AFF4DE}"/>
+          </ac:inkMkLst>
+        </pc:inkChg>
+        <pc:inkChg chg="add">
+          <ac:chgData name="Carlos Leonel Ramirez Martinez" userId="14d3900238d93848" providerId="Windows Live" clId="Web-{25CCCBBB-F558-4A29-9945-0D5E7B18F6C8}" dt="2022-08-05T02:54:41.947" v="27"/>
+          <ac:inkMkLst>
+            <pc:docMk/>
+            <pc:sldMk cId="3071268492" sldId="438"/>
+            <ac:inkMk id="8" creationId="{66215F95-CBDF-AE63-256A-6340E2782FFF}"/>
+          </ac:inkMkLst>
+        </pc:inkChg>
+        <pc:inkChg chg="add">
+          <ac:chgData name="Carlos Leonel Ramirez Martinez" userId="14d3900238d93848" providerId="Windows Live" clId="Web-{25CCCBBB-F558-4A29-9945-0D5E7B18F6C8}" dt="2022-08-05T02:54:49.900" v="28"/>
+          <ac:inkMkLst>
+            <pc:docMk/>
+            <pc:sldMk cId="3071268492" sldId="438"/>
+            <ac:inkMk id="10" creationId="{047D4EB7-178C-F294-647E-828128653148}"/>
+          </ac:inkMkLst>
+        </pc:inkChg>
+        <pc:inkChg chg="add">
+          <ac:chgData name="Carlos Leonel Ramirez Martinez" userId="14d3900238d93848" providerId="Windows Live" clId="Web-{25CCCBBB-F558-4A29-9945-0D5E7B18F6C8}" dt="2022-08-05T02:54:51.088" v="29"/>
+          <ac:inkMkLst>
+            <pc:docMk/>
+            <pc:sldMk cId="3071268492" sldId="438"/>
+            <ac:inkMk id="12" creationId="{8C25F653-809B-F072-FA47-0A69D58F31FE}"/>
+          </ac:inkMkLst>
+        </pc:inkChg>
+        <pc:inkChg chg="add">
+          <ac:chgData name="Carlos Leonel Ramirez Martinez" userId="14d3900238d93848" providerId="Windows Live" clId="Web-{25CCCBBB-F558-4A29-9945-0D5E7B18F6C8}" dt="2022-08-05T02:55:31.917" v="30"/>
+          <ac:inkMkLst>
+            <pc:docMk/>
+            <pc:sldMk cId="3071268492" sldId="438"/>
+            <ac:inkMk id="14" creationId="{EAE7FB1C-107C-24DE-A9AD-4A470D54D598}"/>
+          </ac:inkMkLst>
+        </pc:inkChg>
+        <pc:inkChg chg="add">
+          <ac:chgData name="Carlos Leonel Ramirez Martinez" userId="14d3900238d93848" providerId="Windows Live" clId="Web-{25CCCBBB-F558-4A29-9945-0D5E7B18F6C8}" dt="2022-08-05T02:55:32.714" v="31"/>
+          <ac:inkMkLst>
+            <pc:docMk/>
+            <pc:sldMk cId="3071268492" sldId="438"/>
+            <ac:inkMk id="16" creationId="{0882D3A9-DDB4-34B7-B9B5-17E6C93611B7}"/>
+          </ac:inkMkLst>
+        </pc:inkChg>
+        <pc:inkChg chg="add">
+          <ac:chgData name="Carlos Leonel Ramirez Martinez" userId="14d3900238d93848" providerId="Windows Live" clId="Web-{25CCCBBB-F558-4A29-9945-0D5E7B18F6C8}" dt="2022-08-05T02:55:36.449" v="32"/>
+          <ac:inkMkLst>
+            <pc:docMk/>
+            <pc:sldMk cId="3071268492" sldId="438"/>
+            <ac:inkMk id="17" creationId="{5D63DED5-7CFA-BBA5-5B9D-46925CCC131A}"/>
+          </ac:inkMkLst>
+        </pc:inkChg>
+        <pc:inkChg chg="add">
+          <ac:chgData name="Carlos Leonel Ramirez Martinez" userId="14d3900238d93848" providerId="Windows Live" clId="Web-{25CCCBBB-F558-4A29-9945-0D5E7B18F6C8}" dt="2022-08-05T02:55:38.355" v="33"/>
+          <ac:inkMkLst>
+            <pc:docMk/>
+            <pc:sldMk cId="3071268492" sldId="438"/>
+            <ac:inkMk id="18" creationId="{13B8FE41-E64E-C393-2FB1-E1FA1B3A23D5}"/>
+          </ac:inkMkLst>
+        </pc:inkChg>
+        <pc:inkChg chg="add">
+          <ac:chgData name="Carlos Leonel Ramirez Martinez" userId="14d3900238d93848" providerId="Windows Live" clId="Web-{25CCCBBB-F558-4A29-9945-0D5E7B18F6C8}" dt="2022-08-05T02:55:49.605" v="34"/>
+          <ac:inkMkLst>
+            <pc:docMk/>
+            <pc:sldMk cId="3071268492" sldId="438"/>
+            <ac:inkMk id="19" creationId="{9D094FC9-3A51-2F57-3E40-3B6AD36F63D0}"/>
+          </ac:inkMkLst>
+        </pc:inkChg>
+        <pc:inkChg chg="add">
+          <ac:chgData name="Carlos Leonel Ramirez Martinez" userId="14d3900238d93848" providerId="Windows Live" clId="Web-{25CCCBBB-F558-4A29-9945-0D5E7B18F6C8}" dt="2022-08-05T02:55:51.762" v="35"/>
+          <ac:inkMkLst>
+            <pc:docMk/>
+            <pc:sldMk cId="3071268492" sldId="438"/>
+            <ac:inkMk id="20" creationId="{C3ECFBC6-AF7A-E67A-D875-582BBD5ED554}"/>
+          </ac:inkMkLst>
+        </pc:inkChg>
+      </pc:sldChg>
+    </pc:docChg>
+  </pc:docChgLst>
   <pc:docChgLst>
     <pc:chgData name="Carlos Leonel Ramirez Martinez" userId="14d3900238d93848" providerId="LiveId" clId="{7764BF26-6C29-4F72-93A4-5DAFD0922132}"/>
     <pc:docChg chg="undo custSel addSld delSld modSld sldOrd modMainMaster">
@@ -1581,7 +1799,7 @@
           <a:p>
             <a:fld id="{A3B01B8E-6903-45BA-A25F-2464378F68B7}" type="datetimeFigureOut">
               <a:rPr lang="en-US" smtClean="0"/>
-              <a:t>8/2/2022</a:t>
+              <a:t>8/4/2022</a:t>
             </a:fld>
             <a:endParaRPr lang="en-US"/>
           </a:p>
@@ -1674,6 +1892,409 @@
   </p:cSld>
   <p:clrMap bg1="lt1" tx1="dk1" bg2="lt2" tx2="dk2" accent1="accent1" accent2="accent2" accent3="accent3" accent4="accent4" accent5="accent5" accent6="accent6" hlink="hlink" folHlink="folHlink"/>
 </p:handoutMaster>
+</file>
+
+<file path=ppt/ink/ink1.xml><?xml version="1.0" encoding="utf-8"?>
+<inkml:ink xmlns:inkml="http://www.w3.org/2003/InkML">
+  <inkml:definitions>
+    <inkml:context xml:id="ctx0">
+      <inkml:inkSource xml:id="inkSrc0">
+        <inkml:traceFormat>
+          <inkml:channel name="X" type="integer" min="-2.14748E9" max="2.14748E9" units="cm"/>
+          <inkml:channel name="Y" type="integer" min="-2.14748E9" max="2.14748E9" units="cm"/>
+          <inkml:channel name="F" type="integer" max="32767" units="dev"/>
+          <inkml:channel name="OA" type="integer" max="360" units="deg"/>
+          <inkml:channel name="OE" type="integer" max="90" units="deg"/>
+        </inkml:traceFormat>
+        <inkml:channelProperties>
+          <inkml:channelProperty channel="X" name="resolution" value="1000" units="1/cm"/>
+          <inkml:channelProperty channel="Y" name="resolution" value="1000" units="1/cm"/>
+          <inkml:channelProperty channel="F" name="resolution" value="0" units="1/dev"/>
+          <inkml:channelProperty channel="OA" name="resolution" value="1000" units="1/deg"/>
+          <inkml:channelProperty channel="OE" name="resolution" value="1000" units="1/deg"/>
+        </inkml:channelProperties>
+      </inkml:inkSource>
+    </inkml:context>
+    <inkml:brush xml:id="br0">
+      <inkml:brushProperty name="width" value="0.1" units="cm"/>
+      <inkml:brushProperty name="height" value="0.1" units="cm"/>
+      <inkml:brushProperty name="color" value="#E71224"/>
+    </inkml:brush>
+  </inkml:definitions>
+  <inkml:trace contextRef="#ctx0" brushRef="#br0">9111 7614 743 0 0,'-2'0'9210'0'0,"-3"-1"-10170"0"0,-2-1 960 0 0</inkml:trace>
+</inkml:ink>
+</file>
+
+<file path=ppt/ink/ink10.xml><?xml version="1.0" encoding="utf-8"?>
+<inkml:ink xmlns:inkml="http://www.w3.org/2003/InkML">
+  <inkml:definitions>
+    <inkml:context xml:id="ctx0">
+      <inkml:inkSource xml:id="inkSrc0">
+        <inkml:traceFormat>
+          <inkml:channel name="X" type="integer" min="-2.14748E9" max="2.14748E9" units="cm"/>
+          <inkml:channel name="Y" type="integer" min="-2.14748E9" max="2.14748E9" units="cm"/>
+          <inkml:channel name="F" type="integer" max="32767" units="dev"/>
+          <inkml:channel name="OA" type="integer" max="360" units="deg"/>
+          <inkml:channel name="OE" type="integer" max="90" units="deg"/>
+        </inkml:traceFormat>
+        <inkml:channelProperties>
+          <inkml:channelProperty channel="X" name="resolution" value="1000" units="1/cm"/>
+          <inkml:channelProperty channel="Y" name="resolution" value="1000" units="1/cm"/>
+          <inkml:channelProperty channel="F" name="resolution" value="0" units="1/dev"/>
+          <inkml:channelProperty channel="OA" name="resolution" value="1000" units="1/deg"/>
+          <inkml:channelProperty channel="OE" name="resolution" value="1000" units="1/deg"/>
+        </inkml:channelProperties>
+      </inkml:inkSource>
+    </inkml:context>
+    <inkml:brush xml:id="br0">
+      <inkml:brushProperty name="width" value="0.1" units="cm"/>
+      <inkml:brushProperty name="height" value="0.1" units="cm"/>
+      <inkml:brushProperty name="color" value="#E71224"/>
+    </inkml:brush>
+  </inkml:definitions>
+  <inkml:trace contextRef="#ctx0" brushRef="#br0">11113 13721 9057 0 0,'1'0'13891'0'0,"3"2"-13811"0"0,3 0-72 0 0,3 3-8 0 0,2-1 8 0 0,3 1 0 0 0,0 0-8 0 0,1 1 8 0 0,2-1-8 0 0,1-1 0 0 0,1-1 0 0 0,-1-1 0 0 0,0-1 0 0 0,-1-1 0 0 0,-1 1 0 0 0,-1 2 8 0 0,0-1 8 0 0,0-1-8 0 0,0 0 0 0 0,17 0 616 0 0,5-1-520 0 0,-2 1 64 0 0,-4-1 16 0 0,-5 0 40 0 0,-6-1-15 0 0,-2 1-57 0 0,-3 0 40 0 0,-1 0 0 0 0,-1 0-72 0 0,1 0-32 0 0,1 0-40 0 0,0 0 8 0 0,1 0-40 0 0,-1 0-16 0 0,1 0 8 0 0,-1 0 40 0 0,-2 0-48 0 0,0 2 8 0 0,-2 0 0 0 0,-1 1 0 0 0,0-1 56 0 0,-1-1-56 0 0,1 0 0 0 0,-1-1 8 0 0,2 0 40 0 0,1 2-40 0 0,0 0-16 0 0,1 1 16 0 0,0-2-8 0 0,2 1 0 0 0,1-2 40 0 0,-1 1-32 0 0,0 1 56 0 0,0 0-64 0 0,-1 0 128 0 0,-1 0-16 0 0,6-1 384 0 0,11 2-400 0 0,3-1-48 0 0,-3 1-56 0 0,-3-1-8 0 0,-6-1 8 0 0,-5 0 48 0 0,-3-1-40 0 0,-2 0 160 0 0,-2 0 120 0 0,0 0-280 0 0,1 0 16 0 0,1 0-16 0 0,1 0 80 0 0,-1 0-88 0 0,-1 0 8 0 0,0 0 40 0 0,0 0-32 0 0,0 0 320 0 0,0 1-56 0 0,-1 2-264 0 0,1 1-4929 0 0,1 0-1376 0 0,1-2 16 0 0,2-4-4409 0 0,-2-1 10682 0 0</inkml:trace>
+</inkml:ink>
+</file>
+
+<file path=ppt/ink/ink11.xml><?xml version="1.0" encoding="utf-8"?>
+<inkml:ink xmlns:inkml="http://www.w3.org/2003/InkML">
+  <inkml:definitions>
+    <inkml:context xml:id="ctx0">
+      <inkml:inkSource xml:id="inkSrc0">
+        <inkml:traceFormat>
+          <inkml:channel name="X" type="integer" min="-2.14748E9" max="2.14748E9" units="cm"/>
+          <inkml:channel name="Y" type="integer" min="-2.14748E9" max="2.14748E9" units="cm"/>
+          <inkml:channel name="F" type="integer" max="32767" units="dev"/>
+          <inkml:channel name="OA" type="integer" max="360" units="deg"/>
+          <inkml:channel name="OE" type="integer" max="90" units="deg"/>
+        </inkml:traceFormat>
+        <inkml:channelProperties>
+          <inkml:channelProperty channel="X" name="resolution" value="1000" units="1/cm"/>
+          <inkml:channelProperty channel="Y" name="resolution" value="1000" units="1/cm"/>
+          <inkml:channelProperty channel="F" name="resolution" value="0" units="1/dev"/>
+          <inkml:channelProperty channel="OA" name="resolution" value="1000" units="1/deg"/>
+          <inkml:channelProperty channel="OE" name="resolution" value="1000" units="1/deg"/>
+        </inkml:channelProperties>
+      </inkml:inkSource>
+    </inkml:context>
+    <inkml:brush xml:id="br0">
+      <inkml:brushProperty name="width" value="0.1" units="cm"/>
+      <inkml:brushProperty name="height" value="0.1" units="cm"/>
+      <inkml:brushProperty name="color" value="#E71224"/>
+    </inkml:brush>
+  </inkml:definitions>
+  <inkml:trace contextRef="#ctx0" brushRef="#br0">12181 7340 2672 0 0,'4'0'1920'0'0,"6"0"-1872"0"0,13 1-48 0 0,12 4-176 0 0,21 3-728 0 0,19 4-2656 0 0,-4 1 3560 0 0</inkml:trace>
+</inkml:ink>
+</file>
+
+<file path=ppt/ink/ink12.xml><?xml version="1.0" encoding="utf-8"?>
+<inkml:ink xmlns:inkml="http://www.w3.org/2003/InkML">
+  <inkml:definitions>
+    <inkml:context xml:id="ctx0">
+      <inkml:inkSource xml:id="inkSrc0">
+        <inkml:traceFormat>
+          <inkml:channel name="X" type="integer" min="-2.14748E9" max="2.14748E9" units="cm"/>
+          <inkml:channel name="Y" type="integer" min="-2.14748E9" max="2.14748E9" units="cm"/>
+          <inkml:channel name="F" type="integer" max="32767" units="dev"/>
+          <inkml:channel name="OA" type="integer" max="360" units="deg"/>
+          <inkml:channel name="OE" type="integer" max="90" units="deg"/>
+        </inkml:traceFormat>
+        <inkml:channelProperties>
+          <inkml:channelProperty channel="X" name="resolution" value="1000" units="1/cm"/>
+          <inkml:channelProperty channel="Y" name="resolution" value="1000" units="1/cm"/>
+          <inkml:channelProperty channel="F" name="resolution" value="0" units="1/dev"/>
+          <inkml:channelProperty channel="OA" name="resolution" value="1000" units="1/deg"/>
+          <inkml:channelProperty channel="OE" name="resolution" value="1000" units="1/deg"/>
+        </inkml:channelProperties>
+      </inkml:inkSource>
+    </inkml:context>
+    <inkml:brush xml:id="br0">
+      <inkml:brushProperty name="width" value="0.1" units="cm"/>
+      <inkml:brushProperty name="height" value="0.1" units="cm"/>
+      <inkml:brushProperty name="color" value="#E71224"/>
+    </inkml:brush>
+  </inkml:definitions>
+  <inkml:trace contextRef="#ctx0" brushRef="#br0">30628 12970 14867 0 0,'2'0'4408'0'0,"2"-2"-2767"0"0,4-2-633 0 0,3-3-344 0 0,3-1 80 0 0,2-2 0 0 0,1 2-119 0 0,1-2-73 0 0,1-2 24 0 0,0 1-96 0 0,0-2-136 0 0,1-3-88 0 0,2-2-80 0 0,1-3-16 0 0,2-3-152 0 0,1-6 88 0 0,1-4 32 0 0,3-3 56 0 0,0-2-32 0 0,1 0-8 0 0,-1 0-24 0 0,-2 0 48 0 0,-2-1-8 0 0,-4 1 40 0 0,-4 1-15 0 0,-1-2-41 0 0,-2 0-24 0 0,-2-1-16 0 0,1-3-8 0 0,0-2 24 0 0,1-3-24 0 0,-1-1-48 0 0,0-4 48 0 0,-1-2-48 0 0,-1 1 24 0 0,-1-2 16 0 0,-1-2-32 0 0,-2 0 40 0 0,-2-11-32 0 0,-2-5-56 0 0,-1-10 56 0 0,-2-36 16 0 0,0-7-80 0 0,-3-4-16 0 0,-3 12 8 0 0,-1 16 0 0 0,-5 14 8 0 0,-1 12 0 0 0,-1 9 0 0 0,-2 4 8 0 0,-1-3-56 0 0,-3 1 40 0 0,1 4 16 0 0,2 5-8 0 0,-1 4 8 0 0,0 3 0 0 0,-3 2 0 0 0,-2 0 0 0 0,-2-1 0 0 0,-3 0-8 0 0,-2-1-72 0 0,-1-3-72 0 0,-4-3 96 0 0,-2-2 48 0 0,-2-3 8 0 0,-1 2-8 0 0,-1 0 0 0 0,2 3 0 0 0,-1 1 0 0 0,2 2 0 0 0,1 2 0 0 0,1 1-8 0 0,2 3 0 0 0,-1 1-40 0 0,-15-12-80 0 0,-34-27 40 0 0,-48-24 56 0 0,-12 1-40 0 0,4 13 64 0 0,14 16 8 0 0,15 15 8 0 0,14 13 0 0 0,11 10-8 0 0,6 7-8 0 0,7 2 0 0 0,5 1-64 0 0,2 3 24 0 0,2 0 40 0 0,3 3 0 0 0,2-1 0 0 0,0 1 8 0 0,0 1-8 0 0,-2 0 8 0 0,-3 0 0 0 0,-1 1 0 0 0,-3-1-16 0 0,-2-1 16 0 0,-3-1-8 0 0,-1 0 0 0 0,0-1 8 0 0,-2-2 0 0 0,1 1 0 0 0,-1 1-8 0 0,2 0 0 0 0,0 2 0 0 0,0 2 0 0 0,1 1 8 0 0,-1 1-16 0 0,2 3 8 0 0,1 2 0 0 0,-34-5 0 0 0,-36-7-24 0 0,-11-5 88 0 0,13 3-48 0 0,23 3-16 0 0,24 6 8 0 0,18 4 0 0 0,15 4-8 0 0,7 1 8 0 0,3 0 0 0 0,0-1 0 0 0,-3-2 8 0 0,-3 1-8 0 0,-4-2 8 0 0,-2-1 32 0 0,-2 1-32 0 0,0-1-8 0 0,3 0-8 0 0,3 0 0 0 0,4 3 8 0 0,6 1-48 0 0,3 3 40 0 0,2 1 8 0 0,1 2-8 0 0,0-1 8 0 0,-1 2 0 0 0,1 0 0 0 0,1-1 0 0 0,1 2 0 0 0,2-1 0 0 0,0 0 8 0 0,0 0 0 0 0,2 0-8 0 0,0 0 0 0 0,1 0 0 0 0,-1 0-8 0 0,-2 0 8 0 0,-2 0 0 0 0,-54-2 16 0 0,-24 1-8 0 0,2 1 8 0 0,5 3 16 0 0,15 1-24 0 0,18 1 0 0 0,17 2-8 0 0,13 0 8 0 0,7 0 8 0 0,5 1-16 0 0,1-1 8 0 0,0 0 0 0 0,1 2 0 0 0,-1 1 0 0 0,1 1 8 0 0,0 0-8 0 0,5 0 8 0 0,2 0 32 0 0,5 0-48 0 0,3 0 0 0 0,3-2 8 0 0,2 1 0 0 0,1 0-8 0 0,1 0 8 0 0,0-2 0 0 0,0 2 0 0 0,0 0-8 0 0,0 0 8 0 0,0 1 0 0 0,-1-1 0 0 0,-1 0 0 0 0,-1 1 88 0 0,-5 2-24 0 0,-15 4 72 0 0,-4 2-136 0 0,0 0-8 0 0,1 0 8 0 0,3-1 8 0 0,3-1-8 0 0,4-2 8 0 0,2 1-16 0 0,4-2-8 0 0,1 0 0 0 0,3-2 8 0 0,-1 1 0 0 0,0 1 0 0 0,-1-1 0 0 0,-1 0-8 0 0,1 2 8 0 0,0-2-8 0 0,1 1 8 0 0,2 1 0 0 0,1 0 8 0 0,0 0 0 0 0,0-1-8 0 0,0 3 0 0 0,-3 0 0 0 0,-1-1 24 0 0,1 2-24 0 0,-1 0 0 0 0,-1-1 88 0 0,1-1-80 0 0,2 0-8 0 0,2-2 8 0 0,1-1 32 0 0,0 0-24 0 0,-2 1 40 0 0,0-1-48 0 0,-1 1 8 0 0,-6 0 40 0 0,-14 5 8 0 0,-5 2-56 0 0,1-1 0 0 0,5-2 40 0 0,5-1-40 0 0,6-2 0 0 0,5-2 40 0 0,5-2-40 0 0,2 1 0 0 0,-1-2 0 0 0,1 2 0 0 0,0-1 40 0 0,-1 1-32 0 0,0 0-8 0 0,0 0 0 0 0,-1 0 56 0 0,1 1-64 0 0,2-1 8 0 0,0 0-8 0 0,-1 0 8 0 0,2 1-8 0 0,0 1 8 0 0,0 1 0 0 0,0-1 0 0 0,-1 0 0 0 0,-2 2 48 0 0,0-1-48 0 0,-1 2 0 0 0,-2 2-8 0 0,-2 0 16 0 0,-1 1-8 0 0,-1 0 0 0 0,0-1 0 0 0,1-1 0 0 0,2-1 0 0 0,1-2 40 0 0,5 0-11827 0 0,6 1 801 0 0,7 0 2905 0 0,3-1 8073 0 0</inkml:trace>
+</inkml:ink>
+</file>
+
+<file path=ppt/ink/ink13.xml><?xml version="1.0" encoding="utf-8"?>
+<inkml:ink xmlns:inkml="http://www.w3.org/2003/InkML">
+  <inkml:definitions>
+    <inkml:context xml:id="ctx0">
+      <inkml:inkSource xml:id="inkSrc0">
+        <inkml:traceFormat>
+          <inkml:channel name="X" type="integer" min="-2.14748E9" max="2.14748E9" units="cm"/>
+          <inkml:channel name="Y" type="integer" min="-2.14748E9" max="2.14748E9" units="cm"/>
+          <inkml:channel name="F" type="integer" max="32767" units="dev"/>
+          <inkml:channel name="OA" type="integer" max="360" units="deg"/>
+          <inkml:channel name="OE" type="integer" max="90" units="deg"/>
+        </inkml:traceFormat>
+        <inkml:channelProperties>
+          <inkml:channelProperty channel="X" name="resolution" value="1000" units="1/cm"/>
+          <inkml:channelProperty channel="Y" name="resolution" value="1000" units="1/cm"/>
+          <inkml:channelProperty channel="F" name="resolution" value="0" units="1/dev"/>
+          <inkml:channelProperty channel="OA" name="resolution" value="1000" units="1/deg"/>
+          <inkml:channelProperty channel="OE" name="resolution" value="1000" units="1/deg"/>
+        </inkml:channelProperties>
+      </inkml:inkSource>
+    </inkml:context>
+    <inkml:brush xml:id="br0">
+      <inkml:brushProperty name="width" value="0.1" units="cm"/>
+      <inkml:brushProperty name="height" value="0.1" units="cm"/>
+      <inkml:brushProperty name="color" value="#E71224"/>
+    </inkml:brush>
+  </inkml:definitions>
+  <inkml:trace contextRef="#ctx0" brushRef="#br0">22924 7837 6385 0 0,'0'-2'7705'0'0,"1"-2"-6144"0"0,3-1-529 0 0,3-1 24 0 0,3-1 104 0 0,2-2-40 0 0,1 2 161 0 0,0-1 1111 0 0,-5 1 3778 0 0,-4 3-6066 0 0,-8 2 32 0 0,-5 5-40 0 0,-21 11 312 0 0,-11 10-240 0 0,-7 6-16 0 0,-12 10 128 0 0,-2 4-128 0 0,4 0-32 0 0,11-6-8 0 0,10-8 8 0 0,15-8 152 0 0,14-9-104 0 0,15-6-48 0 0,16-6-32 0 0,13-5-80 0 0,7-4 40 0 0,6-2 0 0 0,0-1-48 0 0,-2-1 8 0 0,-1 0-8 0 0,-3 1 8 0 0,-2-1-8 0 0,0 1-8 0 0,-1 2 8 0 0,-1 3 0 0 0,-2 2 8 0 0,-3 1 48 0 0,-7 2 40 0 0,-5 3 41 0 0,-5 1-137 0 0,-7 9-32767 0 0,-5 2 32767 0 0</inkml:trace>
+</inkml:ink>
+</file>
+
+<file path=ppt/ink/ink2.xml><?xml version="1.0" encoding="utf-8"?>
+<inkml:ink xmlns:inkml="http://www.w3.org/2003/InkML">
+  <inkml:definitions>
+    <inkml:context xml:id="ctx0">
+      <inkml:inkSource xml:id="inkSrc0">
+        <inkml:traceFormat>
+          <inkml:channel name="X" type="integer" min="-2.14748E9" max="2.14748E9" units="cm"/>
+          <inkml:channel name="Y" type="integer" min="-2.14748E9" max="2.14748E9" units="cm"/>
+          <inkml:channel name="F" type="integer" max="32767" units="dev"/>
+          <inkml:channel name="OA" type="integer" max="360" units="deg"/>
+          <inkml:channel name="OE" type="integer" max="90" units="deg"/>
+        </inkml:traceFormat>
+        <inkml:channelProperties>
+          <inkml:channelProperty channel="X" name="resolution" value="1000" units="1/cm"/>
+          <inkml:channelProperty channel="Y" name="resolution" value="1000" units="1/cm"/>
+          <inkml:channelProperty channel="F" name="resolution" value="0" units="1/dev"/>
+          <inkml:channelProperty channel="OA" name="resolution" value="1000" units="1/deg"/>
+          <inkml:channelProperty channel="OE" name="resolution" value="1000" units="1/deg"/>
+        </inkml:channelProperties>
+      </inkml:inkSource>
+    </inkml:context>
+    <inkml:brush xml:id="br0">
+      <inkml:brushProperty name="width" value="0.1" units="cm"/>
+      <inkml:brushProperty name="height" value="0.1" units="cm"/>
+      <inkml:brushProperty name="color" value="#E71224"/>
+    </inkml:brush>
+  </inkml:definitions>
+  <inkml:trace contextRef="#ctx0" brushRef="#br0">9232 7590 14266 0 0,'-2'-1'3793'0'0,"-2"-2"-3321"0"0,-3 0-272 0 0,-4-1 176 0 0,-4 1 16 0 0,-2 0-136 0 0,-3 5-224 0 0,0 8-40 0 0,1 6 8 0 0,4 1 8 0 0,1 2 112 0 0,1 0 40 0 0,-2-1 40 0 0,0 0 129 0 0,-2-2 7 0 0,-1-2 8 0 0,1-1 112 0 0,0-4 0 0 0,1-1 88 0 0,6-4-32 0 0,6-2-248 0 0,9-5 160 0 0,7-4-40 0 0,9-5 9 0 0,9-6-33 0 0,7-4-32 0 0,6-4-8 0 0,5-2-32 0 0,6-3-32 0 0,5-3 32 0 0,3-2-64 0 0,0-1-104 0 0,-2 2-48 0 0,-6 3-64 0 0,-10 7-8 0 0,-8 5 0 0 0,-9 4-264 0 0,-7 6-1993 0 0,-9 1-16699 0 0,-8 3 13460 0 0,-5 0 5496 0 0</inkml:trace>
+</inkml:ink>
+</file>
+
+<file path=ppt/ink/ink3.xml><?xml version="1.0" encoding="utf-8"?>
+<inkml:ink xmlns:inkml="http://www.w3.org/2003/InkML">
+  <inkml:definitions>
+    <inkml:context xml:id="ctx0">
+      <inkml:inkSource xml:id="inkSrc0">
+        <inkml:traceFormat>
+          <inkml:channel name="X" type="integer" min="-2.14748E9" max="2.14748E9" units="cm"/>
+          <inkml:channel name="Y" type="integer" min="-2.14748E9" max="2.14748E9" units="cm"/>
+          <inkml:channel name="F" type="integer" max="32767" units="dev"/>
+          <inkml:channel name="OA" type="integer" max="360" units="deg"/>
+          <inkml:channel name="OE" type="integer" max="90" units="deg"/>
+        </inkml:traceFormat>
+        <inkml:channelProperties>
+          <inkml:channelProperty channel="X" name="resolution" value="1000" units="1/cm"/>
+          <inkml:channelProperty channel="Y" name="resolution" value="1000" units="1/cm"/>
+          <inkml:channelProperty channel="F" name="resolution" value="0" units="1/dev"/>
+          <inkml:channelProperty channel="OA" name="resolution" value="1000" units="1/deg"/>
+          <inkml:channelProperty channel="OE" name="resolution" value="1000" units="1/deg"/>
+        </inkml:channelProperties>
+      </inkml:inkSource>
+    </inkml:context>
+    <inkml:brush xml:id="br0">
+      <inkml:brushProperty name="width" value="0.1" units="cm"/>
+      <inkml:brushProperty name="height" value="0.1" units="cm"/>
+      <inkml:brushProperty name="color" value="#E71224"/>
+    </inkml:brush>
+  </inkml:definitions>
+  <inkml:trace contextRef="#ctx0" brushRef="#br0">33666 7064 16383 0 0,'0'5'0'0'0,"0"8"0"0"0,0 4 0 0 0,0 2 0 0 0,0 1 0 0 0,0 0 0 0 0,0-1 0 0 0,0-1 0 0 0,0 3 0 0 0,0 0 0 0 0,0-1 0 0 0,0 0 0 0 0,0 1 0 0 0,0 12 0 0 0,0 5 0 0 0,0 7 0 0 0,0 2 0 0 0,0 3 0 0 0,0 0 0 0 0,0-4 0 0 0,0 3 0 0 0,0-3 0 0 0,0-9 0 0 0,0-9 0 0 0,0-7 0 0 0,0-2 0 0 0,0 2 0 0 0,0 4 0 0 0,0-1 0 0 0,3 2 0 0 0,1-2 0 0 0,2 2 0 0 0,0-1 0 0 0,-2-2 0 0 0,-1-3 0 0 0,-1 0 0 0 0,-1-5 0 0 0</inkml:trace>
+</inkml:ink>
+</file>
+
+<file path=ppt/ink/ink4.xml><?xml version="1.0" encoding="utf-8"?>
+<inkml:ink xmlns:inkml="http://www.w3.org/2003/InkML">
+  <inkml:definitions>
+    <inkml:context xml:id="ctx0">
+      <inkml:inkSource xml:id="inkSrc0">
+        <inkml:traceFormat>
+          <inkml:channel name="X" type="integer" min="-2.14748E9" max="2.14748E9" units="cm"/>
+          <inkml:channel name="Y" type="integer" min="-2.14748E9" max="2.14748E9" units="cm"/>
+          <inkml:channel name="F" type="integer" max="32767" units="dev"/>
+          <inkml:channel name="OA" type="integer" max="360" units="deg"/>
+          <inkml:channel name="OE" type="integer" max="90" units="deg"/>
+        </inkml:traceFormat>
+        <inkml:channelProperties>
+          <inkml:channelProperty channel="X" name="resolution" value="1000" units="1/cm"/>
+          <inkml:channelProperty channel="Y" name="resolution" value="1000" units="1/cm"/>
+          <inkml:channelProperty channel="F" name="resolution" value="0" units="1/dev"/>
+          <inkml:channelProperty channel="OA" name="resolution" value="1000" units="1/deg"/>
+          <inkml:channelProperty channel="OE" name="resolution" value="1000" units="1/deg"/>
+        </inkml:channelProperties>
+      </inkml:inkSource>
+    </inkml:context>
+    <inkml:brush xml:id="br0">
+      <inkml:brushProperty name="width" value="0.1" units="cm"/>
+      <inkml:brushProperty name="height" value="0.1" units="cm"/>
+      <inkml:brushProperty name="color" value="#E71224"/>
+    </inkml:brush>
+  </inkml:definitions>
+  <inkml:trace contextRef="#ctx0" brushRef="#br0">14743 11255 9377 0 0,'1'-1'9242'0'0,"4"-2"-8162"0"0,5-1-183 0 0,5-2-281 0 0,7-2-208 0 0,5-1-144 0 0,5-1 24 0 0,5-2 24 0 0,2-2 72 0 0,3-1-40 0 0,1-2 80 0 0,2-3-80 0 0,1-2 8 0 0,-1-3-15 0 0,0-1-41 0 0,-2-1-32 0 0,-2-1-24 0 0,-3-2-56 0 0,-1 0 56 0 0,-1-2-16 0 0,0 0-56 0 0,0 0-8 0 0,1-1-8 0 0,1-4-16 0 0,0 1-88 0 0,1-2 24 0 0,1-1 8 0 0,1-2 8 0 0,1 0 64 0 0,-2-1 16 0 0,0 0 0 0 0,-1-1 0 0 0,-3 2 24 0 0,-3 1 16 0 0,-2 2-80 0 0,-1-1-8 0 0,27-35 321 0 0,8-12-441 0 0,-3 2 64 0 0,-7 10 32 0 0,-11 14 0 0 0,-6 8-40 0 0,-8 9-8 0 0,-8 7 0 0 0,-5 6-40 0 0,-3 4 40 0 0,-1 3-40 0 0,-1 2-8 0 0,-1 1 8 0 0,1-2 0 0 0,2 0-8 0 0,3-3 8 0 0,3-1 0 0 0,3-1 8 0 0,2-1-8 0 0,-2 1 64 0 0,0 2-64 0 0,-3 0 48 0 0,-4 4-40 0 0,-4 3 64 0 0,-1 3-24 0 0,-4 2 32 0 0,0 2-64 0 0,0 1 0 0 0,1-1-32 0 0,-1 2 8 0 0,0-1 40 0 0,0-1-32 0 0,2 1 80 0 0,-5 2-10859 0 0,-7 3 3826 0 0,-6 5-5185 0 0,-2 3 12130 0 0</inkml:trace>
+</inkml:ink>
+</file>
+
+<file path=ppt/ink/ink5.xml><?xml version="1.0" encoding="utf-8"?>
+<inkml:ink xmlns:inkml="http://www.w3.org/2003/InkML">
+  <inkml:definitions>
+    <inkml:context xml:id="ctx0">
+      <inkml:inkSource xml:id="inkSrc0">
+        <inkml:traceFormat>
+          <inkml:channel name="X" type="integer" min="-2.14748E9" max="2.14748E9" units="cm"/>
+          <inkml:channel name="Y" type="integer" min="-2.14748E9" max="2.14748E9" units="cm"/>
+          <inkml:channel name="F" type="integer" max="32767" units="dev"/>
+          <inkml:channel name="OA" type="integer" max="360" units="deg"/>
+          <inkml:channel name="OE" type="integer" max="90" units="deg"/>
+        </inkml:traceFormat>
+        <inkml:channelProperties>
+          <inkml:channelProperty channel="X" name="resolution" value="1000" units="1/cm"/>
+          <inkml:channelProperty channel="Y" name="resolution" value="1000" units="1/cm"/>
+          <inkml:channelProperty channel="F" name="resolution" value="0" units="1/dev"/>
+          <inkml:channelProperty channel="OA" name="resolution" value="1000" units="1/deg"/>
+          <inkml:channelProperty channel="OE" name="resolution" value="1000" units="1/deg"/>
+        </inkml:channelProperties>
+      </inkml:inkSource>
+    </inkml:context>
+    <inkml:brush xml:id="br0">
+      <inkml:brushProperty name="width" value="0.1" units="cm"/>
+      <inkml:brushProperty name="height" value="0.1" units="cm"/>
+      <inkml:brushProperty name="color" value="#E71224"/>
+    </inkml:brush>
+  </inkml:definitions>
+  <inkml:trace contextRef="#ctx0" brushRef="#br0">16245 9414 11746 0 0,'-1'0'5657'0'0,"-4"0"-4649"0"0,-1 0 1625 0 0,1 0-185 0 0,4 0-1792 0 0,4 0-7 0 0,4 0-9 0 0,7 0-88 0 0,7-2-208 0 0,4 0-88 0 0,4-4-16 0 0,3-3-40 0 0,0-1-32 0 0,3-1-8 0 0,2-2-8 0 0,1-1 16 0 0,0 1-56 0 0,0 0 32 0 0,-3 2-16 0 0,-4 2 88 0 0,-6 2 40 0 0,-7 1 33 0 0,-4 0 215 0 0,-3 6 960 0 0,-6 5-1344 0 0,-3 6-24 0 0,-2 5-24 0 0,-1 4-16 0 0,0 3 8 0 0,-1 2-56 0 0,1 2 56 0 0,1-2-56 0 0,-1-1 40 0 0,3-4 0 0 0,0-3 48 0 0,0-2 72 0 0,0-2 272 0 0,1-4-2088 0 0,2-3-15372 0 0,2-2 3610 0 0,0-3 13410 0 0</inkml:trace>
+</inkml:ink>
+</file>
+
+<file path=ppt/ink/ink6.xml><?xml version="1.0" encoding="utf-8"?>
+<inkml:ink xmlns:inkml="http://www.w3.org/2003/InkML">
+  <inkml:definitions>
+    <inkml:context xml:id="ctx0">
+      <inkml:inkSource xml:id="inkSrc0">
+        <inkml:traceFormat>
+          <inkml:channel name="X" type="integer" min="-2.14748E9" max="2.14748E9" units="cm"/>
+          <inkml:channel name="Y" type="integer" min="-2.14748E9" max="2.14748E9" units="cm"/>
+          <inkml:channel name="F" type="integer" max="32767" units="dev"/>
+          <inkml:channel name="OA" type="integer" max="360" units="deg"/>
+          <inkml:channel name="OE" type="integer" max="90" units="deg"/>
+        </inkml:traceFormat>
+        <inkml:channelProperties>
+          <inkml:channelProperty channel="X" name="resolution" value="1000" units="1/cm"/>
+          <inkml:channelProperty channel="Y" name="resolution" value="1000" units="1/cm"/>
+          <inkml:channelProperty channel="F" name="resolution" value="0" units="1/dev"/>
+          <inkml:channelProperty channel="OA" name="resolution" value="1000" units="1/deg"/>
+          <inkml:channelProperty channel="OE" name="resolution" value="1000" units="1/deg"/>
+        </inkml:channelProperties>
+      </inkml:inkSource>
+    </inkml:context>
+    <inkml:brush xml:id="br0">
+      <inkml:brushProperty name="width" value="0.1" units="cm"/>
+      <inkml:brushProperty name="height" value="0.1" units="cm"/>
+      <inkml:brushProperty name="color" value="#E71224"/>
+    </inkml:brush>
+  </inkml:definitions>
+  <inkml:trace contextRef="#ctx0" brushRef="#br0">29020 11065 8697 0 0,'1'0'18156'0'0,"2"-2"-18092"0"0,3-2-56 0 0,2-3 112 0 0,2-3-112 0 0,1-2 88 0 0,0-2-32 0 0,3-3 32 0 0,1-2-88 0 0,3-1 80 0 0,1-1 16 0 0,1-1 8 0 0,3 1-16 0 0,1-1 24 0 0,0 1 32 0 0,0-1-104 0 0,0-1 88 0 0,-1-1 32 0 0,-1 1-16 0 0,-1-2-64 0 0,-3-2 17 0 0,1-1-33 0 0,6-18 240 0 0,2-7-296 0 0,-2-1 40 0 0,-4 3 80 0 0,-4 3-56 0 0,-2 5 8 0 0,-5 1-48 0 0,-1 2-32 0 0,-1 0-8 0 0,-2-2 96 0 0,1-2-88 0 0,-1 1 0 0 0,2-3 64 0 0,-1 1-64 0 0,-1-1 56 0 0,-1 0-56 0 0,0-2 64 0 0,0 0-72 0 0,-1 1 8 0 0,2 1 0 0 0,0 2 0 0 0,2 0 0 0 0,1 2 0 0 0,-1-1 40 0 0,0 1-40 0 0,1 0-8 0 0,-2 0 8 0 0,-2 0-8 0 0,-1-2-8 0 0,-2-3-80 0 0,-1-1 80 0 0,-1-3-40 0 0,0-1 48 0 0,-3-3 0 0 0,1 0-48 0 0,-1-1 48 0 0,-1 1-8 0 0,0 0 0 0 0,1 3-40 0 0,1 1 40 0 0,0 0 0 0 0,-2-34-224 0 0,-1-18 176 0 0,0 3 48 0 0,0 8 0 0 0,0 13-72 0 0,1 13 32 0 0,0 10 48 0 0,-2 7-8 0 0,-1 4 8 0 0,-3 2-8 0 0,-2-1-48 0 0,-3-2 48 0 0,-1-2 8 0 0,-3 0-56 0 0,-1-1 8 0 0,-3 1 48 0 0,-1-1-32 0 0,-1 1 16 0 0,-1 0 16 0 0,1 0 0 0 0,-1 2-64 0 0,-1 1 16 0 0,0 0-48 0 0,-1-1 88 0 0,1 1-64 0 0,0 1 15 0 0,-1 1 49 0 0,-2 2 0 0 0,0 2 0 0 0,1 4 8 0 0,0 1 0 0 0,1 1-8 0 0,0 1 0 0 0,2 3 0 0 0,-1 0 8 0 0,-1 0-48 0 0,-1 1 48 0 0,-1 1 8 0 0,-3-2-8 0 0,-1 0 0 0 0,-21-19-8 0 0,-8-7 8 0 0,1 0-56 0 0,3 5 56 0 0,4 5 0 0 0,5 4 0 0 0,3 2 0 0 0,5 3 0 0 0,2 0 0 0 0,0 2 0 0 0,3 0-8 0 0,-1 1 0 0 0,1 0 8 0 0,-5-2 0 0 0,-4-2-8 0 0,2 3-8 0 0,0 3 16 0 0,3 1-8 0 0,0 3 0 0 0,1 2 8 0 0,0 1 0 0 0,1 2-8 0 0,0 1 8 0 0,1 0 0 0 0,0 0 0 0 0,2-1 0 0 0,-2-2 8 0 0,0 1-8 0 0,0-1 0 0 0,0-1-8 0 0,0 1 16 0 0,2-2-8 0 0,2 1 0 0 0,-1 1 0 0 0,0-1 8 0 0,-1 2-8 0 0,0 1 16 0 0,1 1-16 0 0,1 0 0 0 0,-23-12 0 0 0,-7-4 8 0 0,2 2 0 0 0,5 4-8 0 0,4 3 0 0 0,5 3 0 0 0,0 2 8 0 0,2 1-8 0 0,0 2 8 0 0,-1 1-8 0 0,-1 1 0 0 0,0-1 8 0 0,-1 2-8 0 0,0 0-8 0 0,-1-1 8 0 0,0 0 8 0 0,-2 0-8 0 0,-4 0 8 0 0,-1-1-8 0 0,-2 0 56 0 0,-1-3-56 0 0,-2-1 0 0 0,-1 0 8 0 0,0 0 8 0 0,0 0 64 0 0,-1 1-63 0 0,2 1-9 0 0,0 1 0 0 0,3 1 8 0 0,1 2-8 0 0,2 2 0 0 0,2 2 0 0 0,2 1-8 0 0,2 1 72 0 0,-1 0 0 0 0,1 1 40 0 0,-2 1 8 0 0,1 2-64 0 0,-2-1 64 0 0,1 1-72 0 0,1 0 48 0 0,-11 1 0 0 0,4 2-96 0 0,10 2 0 0 0,15 0-5258 0 0,15 2 1257 0 0,12 0 417 0 0,11 0-1865 0 0,7 0-5793 0 0,3 0 11242 0 0</inkml:trace>
+</inkml:ink>
+</file>
+
+<file path=ppt/ink/ink7.xml><?xml version="1.0" encoding="utf-8"?>
+<inkml:ink xmlns:inkml="http://www.w3.org/2003/InkML">
+  <inkml:definitions>
+    <inkml:context xml:id="ctx0">
+      <inkml:inkSource xml:id="inkSrc0">
+        <inkml:traceFormat>
+          <inkml:channel name="X" type="integer" min="-2.14748E9" max="2.14748E9" units="cm"/>
+          <inkml:channel name="Y" type="integer" min="-2.14748E9" max="2.14748E9" units="cm"/>
+          <inkml:channel name="F" type="integer" max="32767" units="dev"/>
+          <inkml:channel name="OA" type="integer" max="360" units="deg"/>
+          <inkml:channel name="OE" type="integer" max="90" units="deg"/>
+        </inkml:traceFormat>
+        <inkml:channelProperties>
+          <inkml:channelProperty channel="X" name="resolution" value="1000" units="1/cm"/>
+          <inkml:channelProperty channel="Y" name="resolution" value="1000" units="1/cm"/>
+          <inkml:channelProperty channel="F" name="resolution" value="0" units="1/dev"/>
+          <inkml:channelProperty channel="OA" name="resolution" value="1000" units="1/deg"/>
+          <inkml:channelProperty channel="OE" name="resolution" value="1000" units="1/deg"/>
+        </inkml:channelProperties>
+      </inkml:inkSource>
+    </inkml:context>
+    <inkml:brush xml:id="br0">
+      <inkml:brushProperty name="width" value="0.1" units="cm"/>
+      <inkml:brushProperty name="height" value="0.1" units="cm"/>
+      <inkml:brushProperty name="color" value="#E71224"/>
+    </inkml:brush>
+  </inkml:definitions>
+  <inkml:trace contextRef="#ctx0" brushRef="#br0">25072 4609 8025 0 0,'-2'0'18940'0'0,"-2"2"-17348"0"0,-3 0-1111 0 0,-1 1-201 0 0,-5-2-64 0 0,-6 1 0 0 0,-7-2-48 0 0,-5 3 0 0 0,-6-1-88 0 0,-2 1 56 0 0,0-2-56 0 0,-1 1-64 0 0,5-2 32 0 0,3 2-48 0 0,4 1 8 0 0,5-1 0 0 0,5 2 40 0 0,3-1 56 0 0,3 0 368 0 0,3 1-224 0 0,3 4-128 0 0,5 1-112 0 0,4 4 176 0 0,3 3-88 0 0,6 4-88 0 0,5 4 56 0 0,5 3 40 0 0,3 5-96 0 0,3 0 56 0 0,0 0-56 0 0,2 0-8 0 0,-1-2 104 0 0,-2-2-104 0 0,-2-4 72 0 0,-3-3-64 0 0,-4-5 40 0 0,-3-3 96 0 0,-4-2-136 0 0,-2-3 240 0 0,-1-1-1288 0 0,2-4-12555 0 0,3-4-4400 0 0,-1-1 17995 0 0</inkml:trace>
+</inkml:ink>
+</file>
+
+<file path=ppt/ink/ink8.xml><?xml version="1.0" encoding="utf-8"?>
+<inkml:ink xmlns:inkml="http://www.w3.org/2003/InkML">
+  <inkml:definitions>
+    <inkml:context xml:id="ctx0">
+      <inkml:inkSource xml:id="inkSrc0">
+        <inkml:traceFormat>
+          <inkml:channel name="X" type="integer" min="-2.14748E9" max="2.14748E9" units="cm"/>
+          <inkml:channel name="Y" type="integer" min="-2.14748E9" max="2.14748E9" units="cm"/>
+          <inkml:channel name="F" type="integer" max="32767" units="dev"/>
+          <inkml:channel name="OA" type="integer" max="360" units="deg"/>
+          <inkml:channel name="OE" type="integer" max="90" units="deg"/>
+        </inkml:traceFormat>
+        <inkml:channelProperties>
+          <inkml:channelProperty channel="X" name="resolution" value="1000" units="1/cm"/>
+          <inkml:channelProperty channel="Y" name="resolution" value="1000" units="1/cm"/>
+          <inkml:channelProperty channel="F" name="resolution" value="0" units="1/dev"/>
+          <inkml:channelProperty channel="OA" name="resolution" value="1000" units="1/deg"/>
+          <inkml:channelProperty channel="OE" name="resolution" value="1000" units="1/deg"/>
+        </inkml:channelProperties>
+      </inkml:inkSource>
+    </inkml:context>
+    <inkml:brush xml:id="br0">
+      <inkml:brushProperty name="width" value="0.1" units="cm"/>
+      <inkml:brushProperty name="height" value="0.1" units="cm"/>
+      <inkml:brushProperty name="color" value="#E71224"/>
+    </inkml:brush>
+  </inkml:definitions>
+  <inkml:trace contextRef="#ctx0" brushRef="#br0">15939 12917 8249 0 0,'0'2'10378'0'0,"0"-2"-4705"0"0,0-2-5601 0 0,0-2 0 0 0,3-5-24 0 0,4-4-32 0 0,1-3-8 0 0,3-3 0 0 0,0-4 0 0 0,2-1 8 0 0,0 0-8 0 0,-1 0 33 0 0,-2-1-33 0 0,0 0-8 0 0,6-30 64 0 0,-1-11-56 0 0,-1 1 40 0 0,-1 5-40 0 0,2 8-8 0 0,-1 6 8 0 0,-1 4-8 0 0,1 5 8 0 0,0 3-8 0 0,0 1 0 0 0,0-1 0 0 0,1 3 8 0 0,0 1-8 0 0,0 0 8 0 0,1 0-8 0 0,1 1 0 0 0,0 1 8 0 0,1-1-8 0 0,-2-1 0 0 0,-1 0 8 0 0,0-1-8 0 0,0-1 0 0 0,-1 2 8 0 0,0 1-8 0 0,0-1 8 0 0,0 0-8 0 0,-2 0 0 0 0,2-1 8 0 0,-1-1-8 0 0,2 1 8 0 0,0-1-8 0 0,1 0 8 0 0,-1 0-8 0 0,2 2 0 0 0,-3 1 0 0 0,-2 1 8 0 0,-1 2-8 0 0,-3 4 8 0 0,0 2 0 0 0,0-3 48 0 0,2-14 344 0 0,1-4-320 0 0,1 2-32 0 0,0 3 16 0 0,-1 4-56 0 0,2 5 40 0 0,-1 2-48 0 0,1 3 8 0 0,-1 1 64 0 0,1-1-64 0 0,0-1 56 0 0,3-2 120 0 0,0-1-64 0 0,1-1-112 0 0,1 0 136 0 0,-1-2-96 0 0,1 1 24 0 0,0 1-64 0 0,-1 2 0 0 0,1 2 0 0 0,0-1 0 0 0,0 0 0 0 0,-1 2-8 0 0,1 2 8 0 0,0 0 0 0 0,-1-2 0 0 0,0 0 0 0 0,-1-1 0 0 0,0 1-8 0 0,0 0 0 0 0,0 0 8 0 0,0 0 104 0 0,-1 1-56 0 0,1 0 8 0 0,2 0-56 0 0,0-1 8 0 0,2 1 104 0 0,0 0-112 0 0,1 0 8 0 0,18-11 200 0 0,21-11-40 0 0,5-1-160 0 0,-2 4 32 0 0,-10 7-40 0 0,-7 4 80 0 0,-8 5-16 0 0,-6 6-72 0 0,-4 3 112 0 0,-3 1-32 0 0,-1 1 0 0 0,0 1-72 0 0,-2 1-8 0 0,0 0 64 0 0,2-1-64 0 0,-1-1 48 0 0,1-1 0 0 0,0-3-32 0 0,3 1 72 0 0,1-2-80 0 0,0 0 0 0 0,1 1 0 0 0,2-3 0 0 0,-1 1 0 0 0,-2 0 0 0 0,-4 1 40 0 0,-4 2 40 0 0,-1 1-32 0 0,-2 0 40 0 0,-1-1-24 0 0,1-1-24 0 0,2-1-40 0 0,3-1 8 0 0,0-1-8 0 0,0-1 8 0 0,1 0-8 0 0,-1 1 0 0 0,9-10 56 0 0,13-19 8 0 0,1-4-16 0 0,-5 5-56 0 0,-8 10-8 0 0,-5 7 0 0 0,-6 7 0 0 0,-5 4 8 0 0,1 1 0 0 0,1-1 0 0 0,-1-1 8 0 0,-2 3-8 0 0,-1-1 0 0 0,-1 2 0 0 0,-2 0 0 0 0,0 1 8 0 0,-2 0 8 0 0,-1-1-16 0 0,0 0 8 0 0,-2 0 9 0 0,1 1-9 0 0,0-1 40 0 0,2 0-40 0 0,-2 0 0 0 0,0 0 40 0 0,1-1-40 0 0,1-1 80 0 0,2-1-32 0 0,-1-1-40 0 0,1 0 56 0 0,-1 0-16 0 0,0 1-8 0 0,-2 2 16 0 0,0 0-16 0 0,-1 3-48 0 0,-1 0 16 0 0,-1 0-8 0 0,1 2 8 0 0,-2-1 32 0 0,4-6-40 0 0,1-2-8 0 0,1-3 8 0 0,1-2 40 0 0,0 0-40 0 0,-2 0-8 0 0,0-1 8 0 0,-1 1 8 0 0,1 2-8 0 0,-1 2 40 0 0,-1 3-40 0 0,0 0 0 0 0,-1 3 56 0 0,-1-1-64 0 0,0-1 0 0 0,2-2 8 0 0,-1-1 32 0 0,1-2-32 0 0,-2 0 48 0 0,1 0-48 0 0,0-2 104 0 0,-3 1-112 0 0,0-1 0 0 0,-1-4 8 0 0,-4-1-8 0 0,0-4 8 0 0,-2-2-16 0 0,0 0 16 0 0,-2-2-16 0 0,1 1 8 0 0,-1 1-48 0 0,0 2 48 0 0,0 3 0 0 0,1 4 0 0 0,0 0-24 0 0,-1 3 8 0 0,1-1 16 0 0,0 0 0 0 0,-1 0 0 0 0,0-1 8 0 0,-2-2 0 0 0,-3-1-8 0 0,-2-1-8 0 0,-3-5 8 0 0,-1-3 8 0 0,0 0 0 0 0,2 1 40 0 0,1 0-40 0 0,-4-7 160 0 0,-2-5-112 0 0,-1 4 32 0 0,1 6-88 0 0,2 7 16 0 0,0 7-8 0 0,-1 5 0 0 0,2 5 0 0 0,0 3 0 0 0,0 2 0 0 0,3 1-8 0 0,-1 0 8 0 0,0 1-8 0 0,0-3 8 0 0,-2 0 0 0 0,-3 0-8 0 0,-2 0 8 0 0,-2-2 56 0 0,-3 0-64 0 0,-2 1 8 0 0,-2 0 40 0 0,2 1-48 0 0,-1 1 16 0 0,2 0-8 0 0,1 0 8 0 0,-11-6 176 0 0,-4-3-120 0 0,-4 0 16 0 0,5 4-40 0 0,7 4-56 0 0,9 0-17348 0 0,9-3 3954 0 0,8 2 13402 0 0</inkml:trace>
+</inkml:ink>
+</file>
+
+<file path=ppt/ink/ink9.xml><?xml version="1.0" encoding="utf-8"?>
+<inkml:ink xmlns:inkml="http://www.w3.org/2003/InkML">
+  <inkml:definitions>
+    <inkml:context xml:id="ctx0">
+      <inkml:inkSource xml:id="inkSrc0">
+        <inkml:traceFormat>
+          <inkml:channel name="X" type="integer" min="-2.14748E9" max="2.14748E9" units="cm"/>
+          <inkml:channel name="Y" type="integer" min="-2.14748E9" max="2.14748E9" units="cm"/>
+          <inkml:channel name="F" type="integer" max="32767" units="dev"/>
+          <inkml:channel name="OA" type="integer" max="360" units="deg"/>
+          <inkml:channel name="OE" type="integer" max="90" units="deg"/>
+        </inkml:traceFormat>
+        <inkml:channelProperties>
+          <inkml:channelProperty channel="X" name="resolution" value="1000" units="1/cm"/>
+          <inkml:channelProperty channel="Y" name="resolution" value="1000" units="1/cm"/>
+          <inkml:channelProperty channel="F" name="resolution" value="0" units="1/dev"/>
+          <inkml:channelProperty channel="OA" name="resolution" value="1000" units="1/deg"/>
+          <inkml:channelProperty channel="OE" name="resolution" value="1000" units="1/deg"/>
+        </inkml:channelProperties>
+      </inkml:inkSource>
+    </inkml:context>
+    <inkml:brush xml:id="br0">
+      <inkml:brushProperty name="width" value="0.1" units="cm"/>
+      <inkml:brushProperty name="height" value="0.1" units="cm"/>
+      <inkml:brushProperty name="color" value="#E71224"/>
+    </inkml:brush>
+  </inkml:definitions>
+  <inkml:trace contextRef="#ctx0" brushRef="#br0">18542 6546 8457 0 0,'-2'2'17772'0'0,"-4"2"-16972"0"0,-3 0-472 0 0,-1 1-56 0 0,-2 0-8 0 0,1 1 72 0 0,-3 2-48 0 0,-3 0-47 0 0,-5 2-49 0 0,-6 1 64 0 0,-5-1-64 0 0,-4 1-16 0 0,-5 2-32 0 0,-4 0 0 0 0,-9 2 72 0 0,-15 3 192 0 0,5 1 184 0 0,15-1-376 0 0,18 0-208 0 0,15 1 72 0 0,18 1-72 0 0,11 6 32 0 0,10 4-32 0 0,8 3 40 0 0,6 4 0 0 0,2 0-48 0 0,-1 0 0 0 0,0-1 8 0 0,-3-3 0 0 0,-6-4 0 0 0,-4-4-8 0 0,-4-6 0 0 0,-6-3-72 0 0,-3-5-10082 0 0,-3-4 10154 0 0</inkml:trace>
+</inkml:ink>
 </file>
 
 <file path=ppt/notesMasters/notesMaster1.xml><?xml version="1.0" encoding="utf-8"?>
@@ -1757,7 +2378,7 @@
           </a:lstStyle>
           <a:p>
             <a:fld id="{9917F30B-65A4-47A6-B5DF-0CC03F3F9D3B}" type="datetimeFigureOut">
-              <a:t>2/08/2022</a:t>
+              <a:t>04/08/2022</a:t>
             </a:fld>
             <a:endParaRPr lang="es-ES"/>
           </a:p>
@@ -4820,7 +5441,7 @@
           <a:p>
             <a:fld id="{40771E8B-6CA5-40B2-8038-0E112F3DAC1C}" type="datetimeFigureOut">
               <a:rPr lang="es-ES" smtClean="0"/>
-              <a:t>02/08/2022</a:t>
+              <a:t>04/08/2022</a:t>
             </a:fld>
             <a:endParaRPr lang="es-ES"/>
           </a:p>
@@ -5220,7 +5841,7 @@
           <a:p>
             <a:fld id="{40771E8B-6CA5-40B2-8038-0E112F3DAC1C}" type="datetimeFigureOut">
               <a:rPr lang="es-ES" smtClean="0"/>
-              <a:t>02/08/2022</a:t>
+              <a:t>04/08/2022</a:t>
             </a:fld>
             <a:endParaRPr lang="es-ES"/>
           </a:p>
@@ -5533,7 +6154,7 @@
           <a:p>
             <a:fld id="{40771E8B-6CA5-40B2-8038-0E112F3DAC1C}" type="datetimeFigureOut">
               <a:rPr lang="es-ES" smtClean="0"/>
-              <a:t>02/08/2022</a:t>
+              <a:t>04/08/2022</a:t>
             </a:fld>
             <a:endParaRPr lang="es-ES"/>
           </a:p>
@@ -5807,7 +6428,7 @@
           <a:p>
             <a:fld id="{40771E8B-6CA5-40B2-8038-0E112F3DAC1C}" type="datetimeFigureOut">
               <a:rPr lang="es-ES" smtClean="0"/>
-              <a:t>02/08/2022</a:t>
+              <a:t>04/08/2022</a:t>
             </a:fld>
             <a:endParaRPr lang="es-ES"/>
           </a:p>
@@ -6129,7 +6750,7 @@
           <a:p>
             <a:fld id="{40771E8B-6CA5-40B2-8038-0E112F3DAC1C}" type="datetimeFigureOut">
               <a:rPr lang="es-ES" smtClean="0"/>
-              <a:t>02/08/2022</a:t>
+              <a:t>04/08/2022</a:t>
             </a:fld>
             <a:endParaRPr lang="es-ES"/>
           </a:p>
@@ -6428,7 +7049,7 @@
           <a:p>
             <a:fld id="{40771E8B-6CA5-40B2-8038-0E112F3DAC1C}" type="datetimeFigureOut">
               <a:rPr lang="es-ES" smtClean="0"/>
-              <a:t>02/08/2022</a:t>
+              <a:t>04/08/2022</a:t>
             </a:fld>
             <a:endParaRPr lang="es-ES"/>
           </a:p>
@@ -6643,7 +7264,7 @@
           <a:p>
             <a:fld id="{40771E8B-6CA5-40B2-8038-0E112F3DAC1C}" type="datetimeFigureOut">
               <a:rPr lang="es-ES" smtClean="0"/>
-              <a:t>02/08/2022</a:t>
+              <a:t>04/08/2022</a:t>
             </a:fld>
             <a:endParaRPr lang="es-ES"/>
           </a:p>
@@ -6868,7 +7489,7 @@
           <a:p>
             <a:fld id="{40771E8B-6CA5-40B2-8038-0E112F3DAC1C}" type="datetimeFigureOut">
               <a:rPr lang="es-ES" smtClean="0"/>
-              <a:t>02/08/2022</a:t>
+              <a:t>04/08/2022</a:t>
             </a:fld>
             <a:endParaRPr lang="es-ES"/>
           </a:p>
@@ -7040,7 +7661,7 @@
           <a:p>
             <a:fld id="{40771E8B-6CA5-40B2-8038-0E112F3DAC1C}" type="datetimeFigureOut">
               <a:rPr lang="es-ES" smtClean="0"/>
-              <a:t>02/08/2022</a:t>
+              <a:t>04/08/2022</a:t>
             </a:fld>
             <a:endParaRPr lang="es-ES"/>
           </a:p>
@@ -7342,7 +7963,7 @@
           <a:p>
             <a:fld id="{40771E8B-6CA5-40B2-8038-0E112F3DAC1C}" type="datetimeFigureOut">
               <a:rPr lang="es-ES" smtClean="0"/>
-              <a:t>02/08/2022</a:t>
+              <a:t>04/08/2022</a:t>
             </a:fld>
             <a:endParaRPr lang="es-ES"/>
           </a:p>
@@ -7735,7 +8356,7 @@
           <a:p>
             <a:fld id="{40771E8B-6CA5-40B2-8038-0E112F3DAC1C}" type="datetimeFigureOut">
               <a:rPr lang="es-ES" smtClean="0"/>
-              <a:t>02/08/2022</a:t>
+              <a:t>04/08/2022</a:t>
             </a:fld>
             <a:endParaRPr lang="es-ES"/>
           </a:p>
@@ -8001,7 +8622,7 @@
           <a:p>
             <a:fld id="{40771E8B-6CA5-40B2-8038-0E112F3DAC1C}" type="datetimeFigureOut">
               <a:rPr lang="es-ES" smtClean="0"/>
-              <a:t>02/08/2022</a:t>
+              <a:t>04/08/2022</a:t>
             </a:fld>
             <a:endParaRPr lang="es-ES"/>
           </a:p>
@@ -8427,7 +9048,7 @@
           <a:p>
             <a:fld id="{40771E8B-6CA5-40B2-8038-0E112F3DAC1C}" type="datetimeFigureOut">
               <a:rPr lang="es-ES" smtClean="0"/>
-              <a:t>02/08/2022</a:t>
+              <a:t>04/08/2022</a:t>
             </a:fld>
             <a:endParaRPr lang="es-ES"/>
           </a:p>
@@ -8647,7 +9268,7 @@
           <a:p>
             <a:fld id="{40771E8B-6CA5-40B2-8038-0E112F3DAC1C}" type="datetimeFigureOut">
               <a:rPr lang="es-ES" smtClean="0"/>
-              <a:t>02/08/2022</a:t>
+              <a:t>04/08/2022</a:t>
             </a:fld>
             <a:endParaRPr lang="es-ES"/>
           </a:p>
@@ -9127,7 +9748,7 @@
           <a:p>
             <a:fld id="{40771E8B-6CA5-40B2-8038-0E112F3DAC1C}" type="datetimeFigureOut">
               <a:rPr lang="es-ES" smtClean="0"/>
-              <a:t>02/08/2022</a:t>
+              <a:t>04/08/2022</a:t>
             </a:fld>
             <a:endParaRPr lang="es-ES"/>
           </a:p>
@@ -9607,7 +10228,7 @@
           <a:p>
             <a:fld id="{40771E8B-6CA5-40B2-8038-0E112F3DAC1C}" type="datetimeFigureOut">
               <a:rPr lang="es-ES" smtClean="0"/>
-              <a:t>02/08/2022</a:t>
+              <a:t>04/08/2022</a:t>
             </a:fld>
             <a:endParaRPr lang="es-ES"/>
           </a:p>
@@ -10204,7 +10825,7 @@
           <a:p>
             <a:fld id="{40771E8B-6CA5-40B2-8038-0E112F3DAC1C}" type="datetimeFigureOut">
               <a:rPr lang="es-ES" smtClean="0"/>
-              <a:t>02/08/2022</a:t>
+              <a:t>04/08/2022</a:t>
             </a:fld>
             <a:endParaRPr lang="es-ES"/>
           </a:p>
@@ -11333,8 +11954,8 @@
         </p:blipFill>
         <p:spPr>
           <a:xfrm>
-            <a:off x="3066262" y="2281709"/>
-            <a:ext cx="6325483" cy="3972479"/>
+            <a:off x="2518249" y="2072942"/>
+            <a:ext cx="6836962" cy="4285629"/>
           </a:xfrm>
           <a:prstGeom prst="rect">
             <a:avLst/>
@@ -11508,8 +12129,8 @@
         </p:blipFill>
         <p:spPr>
           <a:xfrm>
-            <a:off x="3097086" y="2234077"/>
-            <a:ext cx="6363588" cy="4067743"/>
+            <a:off x="2857004" y="1999214"/>
+            <a:ext cx="7214314" cy="4610537"/>
           </a:xfrm>
           <a:prstGeom prst="rect">
             <a:avLst/>
@@ -15209,7 +15830,7 @@
             <a:pPr lvl="1"/>
             <a:r>
               <a:rPr lang="es-ES" dirty="0"/>
-              <a:t>Shell de comandos basado en texto. </a:t>
+              <a:t>Shell de comandos basado en texto. </a:t>
             </a:r>
           </a:p>
           <a:p>
@@ -15220,11 +15841,14 @@
             </a:r>
           </a:p>
           <a:p>
-            <a:pPr lvl="2"/>
+            <a:pPr marL="461645" lvl="2" indent="-229870"/>
             <a:r>
               <a:rPr lang="es-ES" dirty="0"/>
               <a:t>Utiliza RJ-45 RS-232 @ 9600 bps, 8/1/N (no configurable)</a:t>
             </a:r>
+            <a:endParaRPr lang="es-ES" dirty="0">
+              <a:cs typeface="Calibri" panose="020F0502020204030204"/>
+            </a:endParaRPr>
           </a:p>
           <a:p>
             <a:pPr lvl="1"/>
@@ -15257,14 +15881,17 @@
             </a:r>
           </a:p>
           <a:p>
-            <a:pPr lvl="2"/>
+            <a:pPr marL="461645" lvl="2" indent="-229870"/>
             <a:r>
               <a:rPr lang="es-ES" dirty="0"/>
               <a:t>Requieren la configuración de un puerto de red y el protocolo de acceso.</a:t>
             </a:r>
-          </a:p>
-          <a:p>
-            <a:pPr lvl="2"/>
+            <a:endParaRPr lang="es-ES" dirty="0">
+              <a:cs typeface="Calibri" panose="020F0502020204030204"/>
+            </a:endParaRPr>
+          </a:p>
+          <a:p>
+            <a:pPr marL="461645" lvl="2" indent="-229870"/>
             <a:r>
               <a:rPr lang="es-ES" dirty="0"/>
               <a:t>Muchas plataformas que ejecutan Junos OS también ofrecen un puerto Ethernet de administración dedicado. Este puerto de gestión proporciona acceso </a:t>
@@ -15275,8 +15902,11 @@
             </a:r>
             <a:r>
               <a:rPr lang="es-ES" dirty="0"/>
-              <a:t>..</a:t>
-            </a:r>
+              <a:t>.</a:t>
+            </a:r>
+            <a:endParaRPr lang="es-ES" dirty="0">
+              <a:cs typeface="Calibri"/>
+            </a:endParaRPr>
           </a:p>
         </p:txBody>
       </p:sp>
@@ -16045,6 +16675,108 @@
           </a:prstGeom>
         </p:spPr>
       </p:pic>
+      <mc:AlternateContent xmlns:mc="http://schemas.openxmlformats.org/markup-compatibility/2006">
+        <mc:Choice xmlns:p14="http://schemas.microsoft.com/office/powerpoint/2010/main" Requires="p14">
+          <p:contentPart p14:bwMode="auto" r:id="rId4">
+            <p14:nvContentPartPr>
+              <p14:cNvPr id="4" name="Entrada de lápiz 3">
+                <a:extLst>
+                  <a:ext uri="{FF2B5EF4-FFF2-40B4-BE49-F238E27FC236}">
+                    <a16:creationId xmlns:a16="http://schemas.microsoft.com/office/drawing/2014/main" id="{1CF9C29F-F06D-D8CE-48F1-D64215EEC5D5}"/>
+                  </a:ext>
+                </a:extLst>
+              </p14:cNvPr>
+              <p14:cNvContentPartPr/>
+              <p14:nvPr/>
+            </p14:nvContentPartPr>
+            <p14:xfrm>
+              <a:off x="3541900" y="3858850"/>
+              <a:ext cx="9525" cy="9525"/>
+            </p14:xfrm>
+          </p:contentPart>
+        </mc:Choice>
+        <mc:Fallback>
+          <p:pic>
+            <p:nvPicPr>
+              <p:cNvPr id="4" name="Entrada de lápiz 3">
+                <a:extLst>
+                  <a:ext uri="{FF2B5EF4-FFF2-40B4-BE49-F238E27FC236}">
+                    <a16:creationId xmlns:a16="http://schemas.microsoft.com/office/drawing/2014/main" id="{1CF9C29F-F06D-D8CE-48F1-D64215EEC5D5}"/>
+                  </a:ext>
+                </a:extLst>
+              </p:cNvPr>
+              <p:cNvPicPr/>
+              <p:nvPr/>
+            </p:nvPicPr>
+            <p:blipFill>
+              <a:blip r:embed="rId5"/>
+              <a:stretch>
+                <a:fillRect/>
+              </a:stretch>
+            </p:blipFill>
+            <p:spPr>
+              <a:xfrm>
+                <a:off x="3510150" y="3765505"/>
+                <a:ext cx="72390" cy="198120"/>
+              </a:xfrm>
+              <a:prstGeom prst="rect">
+                <a:avLst/>
+              </a:prstGeom>
+            </p:spPr>
+          </p:pic>
+        </mc:Fallback>
+      </mc:AlternateContent>
+      <mc:AlternateContent xmlns:mc="http://schemas.openxmlformats.org/markup-compatibility/2006">
+        <mc:Choice xmlns:p14="http://schemas.microsoft.com/office/powerpoint/2010/main" Requires="p14">
+          <p:contentPart p14:bwMode="auto" r:id="rId6">
+            <p14:nvContentPartPr>
+              <p14:cNvPr id="6" name="Entrada de lápiz 5">
+                <a:extLst>
+                  <a:ext uri="{FF2B5EF4-FFF2-40B4-BE49-F238E27FC236}">
+                    <a16:creationId xmlns:a16="http://schemas.microsoft.com/office/drawing/2014/main" id="{D9DEBA31-2684-AF01-D4FF-E95F9A29CECF}"/>
+                  </a:ext>
+                </a:extLst>
+              </p14:cNvPr>
+              <p14:cNvContentPartPr/>
+              <p14:nvPr/>
+            </p14:nvContentPartPr>
+            <p14:xfrm>
+              <a:off x="3492475" y="3772040"/>
+              <a:ext cx="247650" cy="152400"/>
+            </p14:xfrm>
+          </p:contentPart>
+        </mc:Choice>
+        <mc:Fallback>
+          <p:pic>
+            <p:nvPicPr>
+              <p:cNvPr id="6" name="Entrada de lápiz 5">
+                <a:extLst>
+                  <a:ext uri="{FF2B5EF4-FFF2-40B4-BE49-F238E27FC236}">
+                    <a16:creationId xmlns:a16="http://schemas.microsoft.com/office/drawing/2014/main" id="{D9DEBA31-2684-AF01-D4FF-E95F9A29CECF}"/>
+                  </a:ext>
+                </a:extLst>
+              </p:cNvPr>
+              <p:cNvPicPr/>
+              <p:nvPr/>
+            </p:nvPicPr>
+            <p:blipFill>
+              <a:blip r:embed="rId7"/>
+              <a:stretch>
+                <a:fillRect/>
+              </a:stretch>
+            </p:blipFill>
+            <p:spPr>
+              <a:xfrm>
+                <a:off x="3474477" y="3753634"/>
+                <a:ext cx="283286" cy="188843"/>
+              </a:xfrm>
+              <a:prstGeom prst="rect">
+                <a:avLst/>
+              </a:prstGeom>
+            </p:spPr>
+          </p:pic>
+        </mc:Fallback>
+      </mc:AlternateContent>
     </p:spTree>
     <p:extLst>
       <p:ext uri="{BB962C8B-B14F-4D97-AF65-F5344CB8AC3E}">
@@ -16340,6 +17072,567 @@
           </a:prstGeom>
         </p:spPr>
       </p:pic>
+      <mc:AlternateContent xmlns:mc="http://schemas.openxmlformats.org/markup-compatibility/2006">
+        <mc:Choice xmlns:p14="http://schemas.microsoft.com/office/powerpoint/2010/main" Requires="p14">
+          <p:contentPart p14:bwMode="auto" r:id="rId8">
+            <p14:nvContentPartPr>
+              <p14:cNvPr id="4" name="Entrada de lápiz 3">
+                <a:extLst>
+                  <a:ext uri="{FF2B5EF4-FFF2-40B4-BE49-F238E27FC236}">
+                    <a16:creationId xmlns:a16="http://schemas.microsoft.com/office/drawing/2014/main" id="{617831BD-FCAD-A980-0D3B-8E6CA515ED47}"/>
+                  </a:ext>
+                </a:extLst>
+              </p14:cNvPr>
+              <p14:cNvContentPartPr/>
+              <p14:nvPr/>
+            </p14:nvContentPartPr>
+            <p14:xfrm>
+              <a:off x="11582399" y="3236767"/>
+              <a:ext cx="9525" cy="352425"/>
+            </p14:xfrm>
+          </p:contentPart>
+        </mc:Choice>
+        <mc:Fallback>
+          <p:pic>
+            <p:nvPicPr>
+              <p:cNvPr id="4" name="Entrada de lápiz 3">
+                <a:extLst>
+                  <a:ext uri="{FF2B5EF4-FFF2-40B4-BE49-F238E27FC236}">
+                    <a16:creationId xmlns:a16="http://schemas.microsoft.com/office/drawing/2014/main" id="{617831BD-FCAD-A980-0D3B-8E6CA515ED47}"/>
+                  </a:ext>
+                </a:extLst>
+              </p:cNvPr>
+              <p:cNvPicPr/>
+              <p:nvPr/>
+            </p:nvPicPr>
+            <p:blipFill>
+              <a:blip r:embed="rId9"/>
+              <a:stretch>
+                <a:fillRect/>
+              </a:stretch>
+            </p:blipFill>
+            <p:spPr>
+              <a:xfrm>
+                <a:off x="11567343" y="3219022"/>
+                <a:ext cx="39944" cy="387561"/>
+              </a:xfrm>
+              <a:prstGeom prst="rect">
+                <a:avLst/>
+              </a:prstGeom>
+            </p:spPr>
+          </p:pic>
+        </mc:Fallback>
+      </mc:AlternateContent>
+      <mc:AlternateContent xmlns:mc="http://schemas.openxmlformats.org/markup-compatibility/2006">
+        <mc:Choice xmlns:p14="http://schemas.microsoft.com/office/powerpoint/2010/main" Requires="p14">
+          <p:contentPart p14:bwMode="auto" r:id="rId10">
+            <p14:nvContentPartPr>
+              <p14:cNvPr id="5" name="Entrada de lápiz 4">
+                <a:extLst>
+                  <a:ext uri="{FF2B5EF4-FFF2-40B4-BE49-F238E27FC236}">
+                    <a16:creationId xmlns:a16="http://schemas.microsoft.com/office/drawing/2014/main" id="{4356B125-E8FB-D920-F318-D52C09AFF4DE}"/>
+                  </a:ext>
+                </a:extLst>
+              </p14:cNvPr>
+              <p14:cNvContentPartPr/>
+              <p14:nvPr/>
+            </p14:nvContentPartPr>
+            <p14:xfrm>
+              <a:off x="5318760" y="4774638"/>
+              <a:ext cx="704850" cy="704850"/>
+            </p14:xfrm>
+          </p:contentPart>
+        </mc:Choice>
+        <mc:Fallback>
+          <p:pic>
+            <p:nvPicPr>
+              <p:cNvPr id="5" name="Entrada de lápiz 4">
+                <a:extLst>
+                  <a:ext uri="{FF2B5EF4-FFF2-40B4-BE49-F238E27FC236}">
+                    <a16:creationId xmlns:a16="http://schemas.microsoft.com/office/drawing/2014/main" id="{4356B125-E8FB-D920-F318-D52C09AFF4DE}"/>
+                  </a:ext>
+                </a:extLst>
+              </p:cNvPr>
+              <p:cNvPicPr/>
+              <p:nvPr/>
+            </p:nvPicPr>
+            <p:blipFill>
+              <a:blip r:embed="rId11"/>
+              <a:stretch>
+                <a:fillRect/>
+              </a:stretch>
+            </p:blipFill>
+            <p:spPr>
+              <a:xfrm>
+                <a:off x="5301184" y="4756675"/>
+                <a:ext cx="740362" cy="740416"/>
+              </a:xfrm>
+              <a:prstGeom prst="rect">
+                <a:avLst/>
+              </a:prstGeom>
+            </p:spPr>
+          </p:pic>
+        </mc:Fallback>
+      </mc:AlternateContent>
+      <mc:AlternateContent xmlns:mc="http://schemas.openxmlformats.org/markup-compatibility/2006">
+        <mc:Choice xmlns:p14="http://schemas.microsoft.com/office/powerpoint/2010/main" Requires="p14">
+          <p:contentPart p14:bwMode="auto" r:id="rId12">
+            <p14:nvContentPartPr>
+              <p14:cNvPr id="8" name="Entrada de lápiz 7">
+                <a:extLst>
+                  <a:ext uri="{FF2B5EF4-FFF2-40B4-BE49-F238E27FC236}">
+                    <a16:creationId xmlns:a16="http://schemas.microsoft.com/office/drawing/2014/main" id="{66215F95-CBDF-AE63-256A-6340E2782FFF}"/>
+                  </a:ext>
+                </a:extLst>
+              </p14:cNvPr>
+              <p14:cNvContentPartPr/>
+              <p14:nvPr/>
+            </p14:nvContentPartPr>
+            <p14:xfrm>
+              <a:off x="5853148" y="4770393"/>
+              <a:ext cx="180975" cy="95250"/>
+            </p14:xfrm>
+          </p:contentPart>
+        </mc:Choice>
+        <mc:Fallback>
+          <p:pic>
+            <p:nvPicPr>
+              <p:cNvPr id="8" name="Entrada de lápiz 7">
+                <a:extLst>
+                  <a:ext uri="{FF2B5EF4-FFF2-40B4-BE49-F238E27FC236}">
+                    <a16:creationId xmlns:a16="http://schemas.microsoft.com/office/drawing/2014/main" id="{66215F95-CBDF-AE63-256A-6340E2782FFF}"/>
+                  </a:ext>
+                </a:extLst>
+              </p:cNvPr>
+              <p:cNvPicPr/>
+              <p:nvPr/>
+            </p:nvPicPr>
+            <p:blipFill>
+              <a:blip r:embed="rId13"/>
+              <a:stretch>
+                <a:fillRect/>
+              </a:stretch>
+            </p:blipFill>
+            <p:spPr>
+              <a:xfrm>
+                <a:off x="5835929" y="4752216"/>
+                <a:ext cx="215764" cy="131241"/>
+              </a:xfrm>
+              <a:prstGeom prst="rect">
+                <a:avLst/>
+              </a:prstGeom>
+            </p:spPr>
+          </p:pic>
+        </mc:Fallback>
+      </mc:AlternateContent>
+      <mc:AlternateContent xmlns:mc="http://schemas.openxmlformats.org/markup-compatibility/2006">
+        <mc:Choice xmlns:p14="http://schemas.microsoft.com/office/powerpoint/2010/main" Requires="p14">
+          <p:contentPart p14:bwMode="auto" r:id="rId14">
+            <p14:nvContentPartPr>
+              <p14:cNvPr id="10" name="Entrada de lápiz 9">
+                <a:extLst>
+                  <a:ext uri="{FF2B5EF4-FFF2-40B4-BE49-F238E27FC236}">
+                    <a16:creationId xmlns:a16="http://schemas.microsoft.com/office/drawing/2014/main" id="{047D4EB7-178C-F294-647E-828128653148}"/>
+                  </a:ext>
+                </a:extLst>
+              </p14:cNvPr>
+              <p14:cNvContentPartPr/>
+              <p14:nvPr/>
+            </p14:nvContentPartPr>
+            <p14:xfrm>
+              <a:off x="8914121" y="3171337"/>
+              <a:ext cx="1781175" cy="2238375"/>
+            </p14:xfrm>
+          </p:contentPart>
+        </mc:Choice>
+        <mc:Fallback>
+          <p:pic>
+            <p:nvPicPr>
+              <p:cNvPr id="10" name="Entrada de lápiz 9">
+                <a:extLst>
+                  <a:ext uri="{FF2B5EF4-FFF2-40B4-BE49-F238E27FC236}">
+                    <a16:creationId xmlns:a16="http://schemas.microsoft.com/office/drawing/2014/main" id="{047D4EB7-178C-F294-647E-828128653148}"/>
+                  </a:ext>
+                </a:extLst>
+              </p:cNvPr>
+              <p:cNvPicPr/>
+              <p:nvPr/>
+            </p:nvPicPr>
+            <p:blipFill>
+              <a:blip r:embed="rId15"/>
+              <a:stretch>
+                <a:fillRect/>
+              </a:stretch>
+            </p:blipFill>
+            <p:spPr>
+              <a:xfrm>
+                <a:off x="8896446" y="3153718"/>
+                <a:ext cx="1816885" cy="2273973"/>
+              </a:xfrm>
+              <a:prstGeom prst="rect">
+                <a:avLst/>
+              </a:prstGeom>
+            </p:spPr>
+          </p:pic>
+        </mc:Fallback>
+      </mc:AlternateContent>
+      <mc:AlternateContent xmlns:mc="http://schemas.openxmlformats.org/markup-compatibility/2006">
+        <mc:Choice xmlns:p14="http://schemas.microsoft.com/office/powerpoint/2010/main" Requires="p14">
+          <p:contentPart p14:bwMode="auto" r:id="rId16">
+            <p14:nvContentPartPr>
+              <p14:cNvPr id="12" name="Entrada de lápiz 11">
+                <a:extLst>
+                  <a:ext uri="{FF2B5EF4-FFF2-40B4-BE49-F238E27FC236}">
+                    <a16:creationId xmlns:a16="http://schemas.microsoft.com/office/drawing/2014/main" id="{8C25F653-809B-F072-FA47-0A69D58F31FE}"/>
+                  </a:ext>
+                </a:extLst>
+              </p14:cNvPr>
+              <p14:cNvContentPartPr/>
+              <p14:nvPr/>
+            </p14:nvContentPartPr>
+            <p14:xfrm>
+              <a:off x="8877442" y="3088004"/>
+              <a:ext cx="161925" cy="161925"/>
+            </p14:xfrm>
+          </p:contentPart>
+        </mc:Choice>
+        <mc:Fallback>
+          <p:pic>
+            <p:nvPicPr>
+              <p:cNvPr id="12" name="Entrada de lápiz 11">
+                <a:extLst>
+                  <a:ext uri="{FF2B5EF4-FFF2-40B4-BE49-F238E27FC236}">
+                    <a16:creationId xmlns:a16="http://schemas.microsoft.com/office/drawing/2014/main" id="{8C25F653-809B-F072-FA47-0A69D58F31FE}"/>
+                  </a:ext>
+                </a:extLst>
+              </p:cNvPr>
+              <p:cNvPicPr/>
+              <p:nvPr/>
+            </p:nvPicPr>
+            <p:blipFill>
+              <a:blip r:embed="rId17"/>
+              <a:stretch>
+                <a:fillRect/>
+              </a:stretch>
+            </p:blipFill>
+            <p:spPr>
+              <a:xfrm>
+                <a:off x="8859612" y="3069972"/>
+                <a:ext cx="197949" cy="197628"/>
+              </a:xfrm>
+              <a:prstGeom prst="rect">
+                <a:avLst/>
+              </a:prstGeom>
+            </p:spPr>
+          </p:pic>
+        </mc:Fallback>
+      </mc:AlternateContent>
+      <mc:AlternateContent xmlns:mc="http://schemas.openxmlformats.org/markup-compatibility/2006">
+        <mc:Choice xmlns:p14="http://schemas.microsoft.com/office/powerpoint/2010/main" Requires="p14">
+          <p:contentPart p14:bwMode="auto" r:id="rId18">
+            <p14:nvContentPartPr>
+              <p14:cNvPr id="14" name="Entrada de lápiz 13">
+                <a:extLst>
+                  <a:ext uri="{FF2B5EF4-FFF2-40B4-BE49-F238E27FC236}">
+                    <a16:creationId xmlns:a16="http://schemas.microsoft.com/office/drawing/2014/main" id="{EAE7FB1C-107C-24DE-A9AD-4A470D54D598}"/>
+                  </a:ext>
+                </a:extLst>
+              </p14:cNvPr>
+              <p14:cNvContentPartPr/>
+              <p14:nvPr/>
+            </p14:nvContentPartPr>
+            <p14:xfrm>
+              <a:off x="5749290" y="3888167"/>
+              <a:ext cx="1104900" cy="2190750"/>
+            </p14:xfrm>
+          </p:contentPart>
+        </mc:Choice>
+        <mc:Fallback>
+          <p:pic>
+            <p:nvPicPr>
+              <p:cNvPr id="14" name="Entrada de lápiz 13">
+                <a:extLst>
+                  <a:ext uri="{FF2B5EF4-FFF2-40B4-BE49-F238E27FC236}">
+                    <a16:creationId xmlns:a16="http://schemas.microsoft.com/office/drawing/2014/main" id="{EAE7FB1C-107C-24DE-A9AD-4A470D54D598}"/>
+                  </a:ext>
+                </a:extLst>
+              </p:cNvPr>
+              <p:cNvPicPr/>
+              <p:nvPr/>
+            </p:nvPicPr>
+            <p:blipFill>
+              <a:blip r:embed="rId19"/>
+              <a:stretch>
+                <a:fillRect/>
+              </a:stretch>
+            </p:blipFill>
+            <p:spPr>
+              <a:xfrm>
+                <a:off x="5731718" y="3870537"/>
+                <a:ext cx="1140403" cy="2226369"/>
+              </a:xfrm>
+              <a:prstGeom prst="rect">
+                <a:avLst/>
+              </a:prstGeom>
+            </p:spPr>
+          </p:pic>
+        </mc:Fallback>
+      </mc:AlternateContent>
+      <mc:AlternateContent xmlns:mc="http://schemas.openxmlformats.org/markup-compatibility/2006">
+        <mc:Choice xmlns:p14="http://schemas.microsoft.com/office/powerpoint/2010/main" Requires="p14">
+          <p:contentPart p14:bwMode="auto" r:id="rId20">
+            <p14:nvContentPartPr>
+              <p14:cNvPr id="16" name="Entrada de lápiz 15">
+                <a:extLst>
+                  <a:ext uri="{FF2B5EF4-FFF2-40B4-BE49-F238E27FC236}">
+                    <a16:creationId xmlns:a16="http://schemas.microsoft.com/office/drawing/2014/main" id="{0882D3A9-DDB4-34B7-B9B5-17E6C93611B7}"/>
+                  </a:ext>
+                </a:extLst>
+              </p14:cNvPr>
+              <p14:cNvContentPartPr/>
+              <p14:nvPr/>
+            </p14:nvContentPartPr>
+            <p14:xfrm>
+              <a:off x="6478642" y="3785234"/>
+              <a:ext cx="209550" cy="219075"/>
+            </p14:xfrm>
+          </p:contentPart>
+        </mc:Choice>
+        <mc:Fallback>
+          <p:pic>
+            <p:nvPicPr>
+              <p:cNvPr id="16" name="Entrada de lápiz 15">
+                <a:extLst>
+                  <a:ext uri="{FF2B5EF4-FFF2-40B4-BE49-F238E27FC236}">
+                    <a16:creationId xmlns:a16="http://schemas.microsoft.com/office/drawing/2014/main" id="{0882D3A9-DDB4-34B7-B9B5-17E6C93611B7}"/>
+                  </a:ext>
+                </a:extLst>
+              </p:cNvPr>
+              <p:cNvPicPr/>
+              <p:nvPr/>
+            </p:nvPicPr>
+            <p:blipFill>
+              <a:blip r:embed="rId21"/>
+              <a:stretch>
+                <a:fillRect/>
+              </a:stretch>
+            </p:blipFill>
+            <p:spPr>
+              <a:xfrm>
+                <a:off x="6460546" y="3767751"/>
+                <a:ext cx="245380" cy="254398"/>
+              </a:xfrm>
+              <a:prstGeom prst="rect">
+                <a:avLst/>
+              </a:prstGeom>
+            </p:spPr>
+          </p:pic>
+        </mc:Fallback>
+      </mc:AlternateContent>
+      <mc:AlternateContent xmlns:mc="http://schemas.openxmlformats.org/markup-compatibility/2006">
+        <mc:Choice xmlns:p14="http://schemas.microsoft.com/office/powerpoint/2010/main" Requires="p14">
+          <p:contentPart p14:bwMode="auto" r:id="rId22">
+            <p14:nvContentPartPr>
+              <p14:cNvPr id="17" name="Entrada de lápiz 16">
+                <a:extLst>
+                  <a:ext uri="{FF2B5EF4-FFF2-40B4-BE49-F238E27FC236}">
+                    <a16:creationId xmlns:a16="http://schemas.microsoft.com/office/drawing/2014/main" id="{5D63DED5-7CFA-BBA5-5B9D-46925CCC131A}"/>
+                  </a:ext>
+                </a:extLst>
+              </p14:cNvPr>
+              <p14:cNvContentPartPr/>
+              <p14:nvPr/>
+            </p14:nvContentPartPr>
+            <p14:xfrm>
+              <a:off x="4011929" y="6368415"/>
+              <a:ext cx="476250" cy="38100"/>
+            </p14:xfrm>
+          </p:contentPart>
+        </mc:Choice>
+        <mc:Fallback>
+          <p:pic>
+            <p:nvPicPr>
+              <p:cNvPr id="17" name="Entrada de lápiz 16">
+                <a:extLst>
+                  <a:ext uri="{FF2B5EF4-FFF2-40B4-BE49-F238E27FC236}">
+                    <a16:creationId xmlns:a16="http://schemas.microsoft.com/office/drawing/2014/main" id="{5D63DED5-7CFA-BBA5-5B9D-46925CCC131A}"/>
+                  </a:ext>
+                </a:extLst>
+              </p:cNvPr>
+              <p:cNvPicPr/>
+              <p:nvPr/>
+            </p:nvPicPr>
+            <p:blipFill>
+              <a:blip r:embed="rId23"/>
+              <a:stretch>
+                <a:fillRect/>
+              </a:stretch>
+            </p:blipFill>
+            <p:spPr>
+              <a:xfrm>
+                <a:off x="3994169" y="6351253"/>
+                <a:ext cx="512132" cy="72081"/>
+              </a:xfrm>
+              <a:prstGeom prst="rect">
+                <a:avLst/>
+              </a:prstGeom>
+            </p:spPr>
+          </p:pic>
+        </mc:Fallback>
+      </mc:AlternateContent>
+      <mc:AlternateContent xmlns:mc="http://schemas.openxmlformats.org/markup-compatibility/2006">
+        <mc:Choice xmlns:p14="http://schemas.microsoft.com/office/powerpoint/2010/main" Requires="p14">
+          <p:contentPart p14:bwMode="auto" r:id="rId24">
+            <p14:nvContentPartPr>
+              <p14:cNvPr id="18" name="Entrada de lápiz 17">
+                <a:extLst>
+                  <a:ext uri="{FF2B5EF4-FFF2-40B4-BE49-F238E27FC236}">
+                    <a16:creationId xmlns:a16="http://schemas.microsoft.com/office/drawing/2014/main" id="{13B8FE41-E64E-C393-2FB1-E1FA1B3A23D5}"/>
+                  </a:ext>
+                </a:extLst>
+              </p14:cNvPr>
+              <p14:cNvContentPartPr/>
+              <p14:nvPr/>
+            </p14:nvContentPartPr>
+            <p14:xfrm>
+              <a:off x="4396739" y="4070984"/>
+              <a:ext cx="95250" cy="9525"/>
+            </p14:xfrm>
+          </p:contentPart>
+        </mc:Choice>
+        <mc:Fallback>
+          <p:pic>
+            <p:nvPicPr>
+              <p:cNvPr id="18" name="Entrada de lápiz 17">
+                <a:extLst>
+                  <a:ext uri="{FF2B5EF4-FFF2-40B4-BE49-F238E27FC236}">
+                    <a16:creationId xmlns:a16="http://schemas.microsoft.com/office/drawing/2014/main" id="{13B8FE41-E64E-C393-2FB1-E1FA1B3A23D5}"/>
+                  </a:ext>
+                </a:extLst>
+              </p:cNvPr>
+              <p:cNvPicPr/>
+              <p:nvPr/>
+            </p:nvPicPr>
+            <p:blipFill>
+              <a:blip r:embed="rId25"/>
+              <a:stretch>
+                <a:fillRect/>
+              </a:stretch>
+            </p:blipFill>
+            <p:spPr>
+              <a:xfrm>
+                <a:off x="4379421" y="4059316"/>
+                <a:ext cx="129540" cy="33099"/>
+              </a:xfrm>
+              <a:prstGeom prst="rect">
+                <a:avLst/>
+              </a:prstGeom>
+            </p:spPr>
+          </p:pic>
+        </mc:Fallback>
+      </mc:AlternateContent>
+      <mc:AlternateContent xmlns:mc="http://schemas.openxmlformats.org/markup-compatibility/2006">
+        <mc:Choice xmlns:p14="http://schemas.microsoft.com/office/powerpoint/2010/main" Requires="p14">
+          <p:contentPart p14:bwMode="auto" r:id="rId26">
+            <p14:nvContentPartPr>
+              <p14:cNvPr id="19" name="Entrada de lápiz 18">
+                <a:extLst>
+                  <a:ext uri="{FF2B5EF4-FFF2-40B4-BE49-F238E27FC236}">
+                    <a16:creationId xmlns:a16="http://schemas.microsoft.com/office/drawing/2014/main" id="{9D094FC9-3A51-2F57-3E40-3B6AD36F63D0}"/>
+                  </a:ext>
+                </a:extLst>
+              </p14:cNvPr>
+              <p14:cNvContentPartPr/>
+              <p14:nvPr/>
+            </p14:nvContentPartPr>
+            <p14:xfrm>
+              <a:off x="8270582" y="4070386"/>
+              <a:ext cx="3019425" cy="2028825"/>
+            </p14:xfrm>
+          </p:contentPart>
+        </mc:Choice>
+        <mc:Fallback>
+          <p:pic>
+            <p:nvPicPr>
+              <p:cNvPr id="19" name="Entrada de lápiz 18">
+                <a:extLst>
+                  <a:ext uri="{FF2B5EF4-FFF2-40B4-BE49-F238E27FC236}">
+                    <a16:creationId xmlns:a16="http://schemas.microsoft.com/office/drawing/2014/main" id="{9D094FC9-3A51-2F57-3E40-3B6AD36F63D0}"/>
+                  </a:ext>
+                </a:extLst>
+              </p:cNvPr>
+              <p:cNvPicPr/>
+              <p:nvPr/>
+            </p:nvPicPr>
+            <p:blipFill>
+              <a:blip r:embed="rId27"/>
+              <a:stretch>
+                <a:fillRect/>
+              </a:stretch>
+            </p:blipFill>
+            <p:spPr>
+              <a:xfrm>
+                <a:off x="8252560" y="4052738"/>
+                <a:ext cx="3055109" cy="2064482"/>
+              </a:xfrm>
+              <a:prstGeom prst="rect">
+                <a:avLst/>
+              </a:prstGeom>
+            </p:spPr>
+          </p:pic>
+        </mc:Fallback>
+      </mc:AlternateContent>
+      <mc:AlternateContent xmlns:mc="http://schemas.openxmlformats.org/markup-compatibility/2006">
+        <mc:Choice xmlns:p14="http://schemas.microsoft.com/office/powerpoint/2010/main" Requires="p14">
+          <p:contentPart p14:bwMode="auto" r:id="rId28">
+            <p14:nvContentPartPr>
+              <p14:cNvPr id="20" name="Entrada de lápiz 19">
+                <a:extLst>
+                  <a:ext uri="{FF2B5EF4-FFF2-40B4-BE49-F238E27FC236}">
+                    <a16:creationId xmlns:a16="http://schemas.microsoft.com/office/drawing/2014/main" id="{C3ECFBC6-AF7A-E67A-D875-582BBD5ED554}"/>
+                  </a:ext>
+                </a:extLst>
+              </p14:cNvPr>
+              <p14:cNvContentPartPr/>
+              <p14:nvPr/>
+            </p14:nvContentPartPr>
+            <p14:xfrm>
+              <a:off x="8136482" y="4228204"/>
+              <a:ext cx="238125" cy="114300"/>
+            </p14:xfrm>
+          </p:contentPart>
+        </mc:Choice>
+        <mc:Fallback>
+          <p:pic>
+            <p:nvPicPr>
+              <p:cNvPr id="20" name="Entrada de lápiz 19">
+                <a:extLst>
+                  <a:ext uri="{FF2B5EF4-FFF2-40B4-BE49-F238E27FC236}">
+                    <a16:creationId xmlns:a16="http://schemas.microsoft.com/office/drawing/2014/main" id="{C3ECFBC6-AF7A-E67A-D875-582BBD5ED554}"/>
+                  </a:ext>
+                </a:extLst>
+              </p:cNvPr>
+              <p:cNvPicPr/>
+              <p:nvPr/>
+            </p:nvPicPr>
+            <p:blipFill>
+              <a:blip r:embed="rId29"/>
+              <a:stretch>
+                <a:fillRect/>
+              </a:stretch>
+            </p:blipFill>
+            <p:spPr>
+              <a:xfrm>
+                <a:off x="8118722" y="4209828"/>
+                <a:ext cx="274007" cy="150685"/>
+              </a:xfrm>
+              <a:prstGeom prst="rect">
+                <a:avLst/>
+              </a:prstGeom>
+            </p:spPr>
+          </p:pic>
+        </mc:Fallback>
+      </mc:AlternateContent>
     </p:spTree>
     <p:extLst>
       <p:ext uri="{BB962C8B-B14F-4D97-AF65-F5344CB8AC3E}">
@@ -17055,24 +18348,11 @@
             </a:r>
             <a:r>
               <a:rPr lang="es-GT" dirty="0"/>
-              <a:t> (JET) API provee una interfaz moderna y </a:t>
-            </a:r>
-            <a:r>
-              <a:rPr lang="es-GT" dirty="0" err="1"/>
-              <a:t>programatica</a:t>
-            </a:r>
-            <a:r>
-              <a:rPr lang="es-GT" dirty="0"/>
-              <a:t> para los operadores de red que quieren aumentar las funcionalidades </a:t>
-            </a:r>
-            <a:r>
-              <a:rPr lang="es-GT" dirty="0" err="1"/>
-              <a:t>core</a:t>
-            </a:r>
-            <a:r>
-              <a:rPr lang="es-GT" dirty="0"/>
-              <a:t> de Junos</a:t>
-            </a:r>
+              <a:t> (JET) API provee una interfaz moderna y programática para los operadores de red que quieren aumentar las funcionalidades CORE de Junos</a:t>
+            </a:r>
+            <a:endParaRPr lang="es-GT" dirty="0">
+              <a:cs typeface="Calibri"/>
+            </a:endParaRPr>
           </a:p>
           <a:p>
             <a:pPr lvl="1"/>
@@ -17101,31 +18381,31 @@
             <a:pPr lvl="1"/>
             <a:r>
               <a:rPr lang="es-GT" dirty="0"/>
-              <a:t>Las aplicaciones JET pueden interactuar con Junos OS a </a:t>
-            </a:r>
-            <a:r>
-              <a:rPr lang="es-GT" dirty="0" err="1"/>
-              <a:t>traves</a:t>
+              <a:t>Las aplicaciones JET pueden interactuar con Junos OS a través de servicios </a:t>
+            </a:r>
+            <a:r>
+              <a:rPr lang="es-GT" b="1" dirty="0" err="1"/>
+              <a:t>requestresponse</a:t>
+            </a:r>
+            <a:r>
+              <a:rPr lang="es-GT" b="1" dirty="0"/>
+              <a:t> </a:t>
             </a:r>
             <a:r>
               <a:rPr lang="es-GT" dirty="0"/>
-              <a:t> de servicios </a:t>
-            </a:r>
-            <a:r>
-              <a:rPr lang="es-GT" dirty="0" err="1"/>
-              <a:t>requestresponse</a:t>
+              <a:t>y </a:t>
+            </a:r>
+            <a:r>
+              <a:rPr lang="es-GT" b="1" dirty="0" err="1"/>
+              <a:t>notification</a:t>
+            </a:r>
+            <a:r>
+              <a:rPr lang="es-GT" b="1" dirty="0"/>
+              <a:t> </a:t>
             </a:r>
             <a:r>
               <a:rPr lang="es-GT" dirty="0"/>
-              <a:t> y </a:t>
-            </a:r>
-            <a:r>
-              <a:rPr lang="es-GT" dirty="0" err="1"/>
-              <a:t>notification</a:t>
-            </a:r>
-            <a:r>
-              <a:rPr lang="es-GT" dirty="0"/>
-              <a:t> sobe canales de transporte basado en </a:t>
+              <a:t>sobe canales de transporte basado en </a:t>
             </a:r>
             <a:r>
               <a:rPr lang="es-GT" dirty="0" err="1"/>
@@ -17274,7 +18554,7 @@
             <a:endParaRPr lang="es-ES" dirty="0"/>
           </a:p>
           <a:p>
-            <a:pPr marL="344488" lvl="1" indent="-344488"/>
+            <a:pPr marL="344170" lvl="1" indent="-344170"/>
             <a:r>
               <a:rPr lang="es-ES" dirty="0"/>
               <a:t>Junos OS requiere un nombre de usuario y </a:t>
@@ -17287,9 +18567,12 @@
               <a:rPr lang="es-ES" dirty="0"/>
               <a:t> para acceder.</a:t>
             </a:r>
-          </a:p>
-          <a:p>
-            <a:pPr marL="344488" lvl="1" indent="-344488"/>
+            <a:endParaRPr lang="es-ES" dirty="0">
+              <a:cs typeface="Calibri"/>
+            </a:endParaRPr>
+          </a:p>
+          <a:p>
+            <a:pPr marL="344170" lvl="1" indent="-344170"/>
             <a:r>
               <a:rPr lang="es-ES" dirty="0"/>
               <a:t>Cuando se inicia sesión con un usuario no-</a:t>
@@ -17302,15 +18585,18 @@
               <a:rPr lang="es-ES" dirty="0"/>
               <a:t>, automáticamente nos ingresa a la CLI</a:t>
             </a:r>
-          </a:p>
-          <a:p>
-            <a:pPr marL="344488" lvl="1" indent="-344488"/>
+            <a:endParaRPr lang="es-ES" dirty="0">
+              <a:cs typeface="Calibri"/>
+            </a:endParaRPr>
+          </a:p>
+          <a:p>
+            <a:pPr marL="344170" lvl="1" indent="-344170"/>
             <a:r>
               <a:rPr lang="es-ES" dirty="0"/>
               <a:t>Todas las plataformas Junos OS tienen únicamente por defecto el usuario </a:t>
             </a:r>
             <a:r>
-              <a:rPr lang="es-ES" dirty="0" err="1"/>
+              <a:rPr lang="es-ES" b="1" dirty="0" err="1"/>
               <a:t>root</a:t>
             </a:r>
             <a:r>
@@ -17325,6 +18611,9 @@
               <a:rPr lang="es-ES" dirty="0"/>
               <a:t>.</a:t>
             </a:r>
+            <a:endParaRPr lang="es-ES" dirty="0">
+              <a:cs typeface="Calibri"/>
+            </a:endParaRPr>
           </a:p>
           <a:p>
             <a:pPr marL="0" lvl="1" indent="0">
@@ -17487,7 +18776,7 @@
             <a:endParaRPr lang="es-ES" dirty="0"/>
           </a:p>
           <a:p>
-            <a:pPr marL="344488" lvl="1" indent="-344488"/>
+            <a:pPr marL="344170" lvl="1" indent="-344170"/>
             <a:r>
               <a:rPr lang="es-ES" sz="3100" dirty="0"/>
               <a:t>En un dispositivo con las configuraciones de fabrica, en lugar del </a:t>
@@ -17508,9 +18797,12 @@
               <a:rPr lang="es-ES" sz="3100" b="1" dirty="0"/>
               <a:t> .</a:t>
             </a:r>
-          </a:p>
-          <a:p>
-            <a:pPr marL="344488" lvl="1" indent="-344488"/>
+            <a:endParaRPr lang="es-ES" sz="3100" b="1" dirty="0">
+              <a:cs typeface="Calibri" panose="020F0502020204030204"/>
+            </a:endParaRPr>
+          </a:p>
+          <a:p>
+            <a:pPr marL="344170" lvl="1" indent="-344170"/>
             <a:r>
               <a:rPr lang="es-ES" sz="3100" dirty="0"/>
               <a:t>El usuario </a:t>
@@ -17523,9 +18815,12 @@
               <a:rPr lang="es-ES" sz="3100" dirty="0"/>
               <a:t> tiene completo control sobre el sistema</a:t>
             </a:r>
-          </a:p>
-          <a:p>
-            <a:pPr marL="344488" lvl="1" indent="-344488"/>
+            <a:endParaRPr lang="es-ES" sz="3100" dirty="0">
+              <a:cs typeface="Calibri"/>
+            </a:endParaRPr>
+          </a:p>
+          <a:p>
+            <a:pPr marL="344170" lvl="1" indent="-344170"/>
             <a:r>
               <a:rPr lang="es-ES" sz="3100" dirty="0"/>
               <a:t>Cuando nos </a:t>
@@ -17565,7 +18860,7 @@
             </a:endParaRPr>
           </a:p>
           <a:p>
-            <a:pPr marL="344488" lvl="1" indent="-344488"/>
+            <a:pPr marL="344170" lvl="1" indent="-344170"/>
             <a:r>
               <a:rPr lang="es-ES" sz="3100" dirty="0"/>
               <a:t>Cuando salimos del CLI, regresamos al </a:t>
@@ -17578,16 +18873,19 @@
               <a:rPr lang="es-ES" sz="3100" dirty="0"/>
               <a:t> UNIX.</a:t>
             </a:r>
-          </a:p>
-          <a:p>
-            <a:pPr marL="344488" lvl="1" indent="-344488"/>
+            <a:endParaRPr lang="es-ES" sz="3100" dirty="0">
+              <a:cs typeface="Calibri"/>
+            </a:endParaRPr>
+          </a:p>
+          <a:p>
+            <a:pPr marL="344170" lvl="1" indent="-344170"/>
             <a:r>
               <a:rPr lang="es-ES" sz="3100" dirty="0"/>
               <a:t>Adicionalmente debemos usar </a:t>
             </a:r>
             <a:r>
               <a:rPr lang="es-ES" sz="3100" dirty="0" err="1">
-                <a:latin typeface="Consolas" panose="020B0609020204030204" pitchFamily="49" charset="0"/>
+                <a:latin typeface="Consolas"/>
               </a:rPr>
               <a:t>exit</a:t>
             </a:r>
@@ -17595,9 +18893,12 @@
               <a:rPr lang="es-ES" sz="3100" dirty="0"/>
               <a:t> para salir por completo</a:t>
             </a:r>
-          </a:p>
-          <a:p>
-            <a:pPr marL="344488" lvl="1" indent="-344488"/>
+            <a:endParaRPr lang="es-ES" sz="3100" dirty="0">
+              <a:cs typeface="Calibri"/>
+            </a:endParaRPr>
+          </a:p>
+          <a:p>
+            <a:pPr marL="344170" lvl="1" indent="-344170"/>
             <a:r>
               <a:rPr lang="es-ES" sz="3100" dirty="0"/>
               <a:t>El usuario y </a:t>
@@ -17611,17 +18912,26 @@
               <a:t> de los laboratorios es </a:t>
             </a:r>
             <a:r>
-              <a:rPr lang="es-ES" sz="3100" dirty="0" err="1"/>
+              <a:rPr lang="es-ES" sz="3100" b="1" dirty="0" err="1"/>
               <a:t>lab</a:t>
             </a:r>
             <a:r>
               <a:rPr lang="es-ES" sz="3100" dirty="0"/>
-              <a:t>/lab123</a:t>
-            </a:r>
-          </a:p>
-          <a:p>
-            <a:pPr marL="344488" lvl="1" indent="-344488"/>
-            <a:endParaRPr lang="es-ES" dirty="0"/>
+              <a:t>/</a:t>
+            </a:r>
+            <a:r>
+              <a:rPr lang="es-ES" sz="3100" b="1" dirty="0"/>
+              <a:t>lab123</a:t>
+            </a:r>
+            <a:endParaRPr lang="es-ES" sz="3100" b="1" dirty="0">
+              <a:cs typeface="Calibri"/>
+            </a:endParaRPr>
+          </a:p>
+          <a:p>
+            <a:pPr marL="344170" lvl="1" indent="-344170"/>
+            <a:endParaRPr lang="es-ES" dirty="0">
+              <a:cs typeface="Calibri" panose="020F0502020204030204"/>
+            </a:endParaRPr>
           </a:p>
           <a:p>
             <a:pPr marL="0" lvl="1" indent="0">

</xml_diff>